<commit_message>
[Done] PCB Part Placement
</commit_message>
<xml_diff>
--- a/HW/Document/N1_Block_Diagram/TPS65217_Test_Bd_Block_Diagram.pptx
+++ b/HW/Document/N1_Block_Diagram/TPS65217_Test_Bd_Block_Diagram.pptx
@@ -5,13 +5,14 @@
     <p:sldMasterId id="2147483648" r:id="rId1"/>
   </p:sldMasterIdLst>
   <p:notesMasterIdLst>
-    <p:notesMasterId r:id="rId6"/>
+    <p:notesMasterId r:id="rId7"/>
   </p:notesMasterIdLst>
   <p:sldIdLst>
     <p:sldId id="256" r:id="rId2"/>
-    <p:sldId id="257" r:id="rId3"/>
-    <p:sldId id="271" r:id="rId4"/>
-    <p:sldId id="272" r:id="rId5"/>
+    <p:sldId id="273" r:id="rId3"/>
+    <p:sldId id="257" r:id="rId4"/>
+    <p:sldId id="271" r:id="rId5"/>
+    <p:sldId id="272" r:id="rId6"/>
   </p:sldIdLst>
   <p:sldSz cx="12192000" cy="6858000"/>
   <p:notesSz cx="6858000" cy="9144000"/>
@@ -6490,9 +6491,7 @@
           </a:prstGeom>
           <a:noFill/>
           <a:ln w="6350">
-            <a:solidFill>
-              <a:schemeClr val="tx1"/>
-            </a:solidFill>
+            <a:noFill/>
           </a:ln>
         </p:spPr>
         <p:style>
@@ -6554,9 +6553,7 @@
           </a:prstGeom>
           <a:noFill/>
           <a:ln w="6350">
-            <a:solidFill>
-              <a:schemeClr val="tx1"/>
-            </a:solidFill>
+            <a:noFill/>
           </a:ln>
         </p:spPr>
         <p:style>
@@ -6618,9 +6615,7 @@
           </a:prstGeom>
           <a:noFill/>
           <a:ln w="6350">
-            <a:solidFill>
-              <a:schemeClr val="tx1"/>
-            </a:solidFill>
+            <a:noFill/>
           </a:ln>
         </p:spPr>
         <p:style>
@@ -6682,9 +6677,7 @@
           </a:prstGeom>
           <a:noFill/>
           <a:ln w="6350">
-            <a:solidFill>
-              <a:schemeClr val="tx1"/>
-            </a:solidFill>
+            <a:noFill/>
           </a:ln>
         </p:spPr>
         <p:style>
@@ -6746,9 +6739,7 @@
           </a:prstGeom>
           <a:noFill/>
           <a:ln w="6350">
-            <a:solidFill>
-              <a:schemeClr val="tx1"/>
-            </a:solidFill>
+            <a:noFill/>
           </a:ln>
         </p:spPr>
         <p:style>
@@ -6810,9 +6801,7 @@
           </a:prstGeom>
           <a:noFill/>
           <a:ln w="6350">
-            <a:solidFill>
-              <a:schemeClr val="tx1"/>
-            </a:solidFill>
+            <a:noFill/>
           </a:ln>
         </p:spPr>
         <p:style>
@@ -7558,9 +7547,7 @@
           </a:prstGeom>
           <a:noFill/>
           <a:ln w="6350">
-            <a:solidFill>
-              <a:schemeClr val="tx1"/>
-            </a:solidFill>
+            <a:noFill/>
           </a:ln>
         </p:spPr>
         <p:style>
@@ -7622,9 +7609,7 @@
           </a:prstGeom>
           <a:noFill/>
           <a:ln w="6350">
-            <a:solidFill>
-              <a:schemeClr val="tx1"/>
-            </a:solidFill>
+            <a:noFill/>
           </a:ln>
         </p:spPr>
         <p:style>
@@ -7686,9 +7671,7 @@
           </a:prstGeom>
           <a:noFill/>
           <a:ln w="6350">
-            <a:solidFill>
-              <a:schemeClr val="tx1"/>
-            </a:solidFill>
+            <a:noFill/>
           </a:ln>
         </p:spPr>
         <p:style>
@@ -7750,9 +7733,7 @@
           </a:prstGeom>
           <a:noFill/>
           <a:ln w="6350">
-            <a:solidFill>
-              <a:schemeClr val="tx1"/>
-            </a:solidFill>
+            <a:noFill/>
           </a:ln>
         </p:spPr>
         <p:style>
@@ -7814,9 +7795,7 @@
           </a:prstGeom>
           <a:noFill/>
           <a:ln w="6350">
-            <a:solidFill>
-              <a:schemeClr val="tx1"/>
-            </a:solidFill>
+            <a:noFill/>
           </a:ln>
         </p:spPr>
         <p:style>
@@ -7878,9 +7857,7 @@
           </a:prstGeom>
           <a:noFill/>
           <a:ln w="6350">
-            <a:solidFill>
-              <a:schemeClr val="tx1"/>
-            </a:solidFill>
+            <a:noFill/>
           </a:ln>
         </p:spPr>
         <p:style>
@@ -8810,9 +8787,7 @@
           </a:prstGeom>
           <a:noFill/>
           <a:ln w="6350">
-            <a:solidFill>
-              <a:schemeClr val="tx1"/>
-            </a:solidFill>
+            <a:noFill/>
           </a:ln>
         </p:spPr>
         <p:style>
@@ -8874,9 +8849,7 @@
           </a:prstGeom>
           <a:noFill/>
           <a:ln w="6350">
-            <a:solidFill>
-              <a:schemeClr val="tx1"/>
-            </a:solidFill>
+            <a:noFill/>
           </a:ln>
         </p:spPr>
         <p:style>
@@ -8938,9 +8911,7 @@
           </a:prstGeom>
           <a:noFill/>
           <a:ln w="6350">
-            <a:solidFill>
-              <a:schemeClr val="tx1"/>
-            </a:solidFill>
+            <a:noFill/>
           </a:ln>
         </p:spPr>
         <p:style>
@@ -9002,9 +8973,7 @@
           </a:prstGeom>
           <a:noFill/>
           <a:ln w="6350">
-            <a:solidFill>
-              <a:schemeClr val="tx1"/>
-            </a:solidFill>
+            <a:noFill/>
           </a:ln>
         </p:spPr>
         <p:style>
@@ -9066,9 +9035,7 @@
           </a:prstGeom>
           <a:noFill/>
           <a:ln w="6350">
-            <a:solidFill>
-              <a:schemeClr val="tx1"/>
-            </a:solidFill>
+            <a:noFill/>
           </a:ln>
         </p:spPr>
         <p:style>
@@ -9130,9 +9097,7 @@
           </a:prstGeom>
           <a:noFill/>
           <a:ln w="6350">
-            <a:solidFill>
-              <a:schemeClr val="tx1"/>
-            </a:solidFill>
+            <a:noFill/>
           </a:ln>
         </p:spPr>
         <p:style>
@@ -9194,9 +9159,7 @@
           </a:prstGeom>
           <a:noFill/>
           <a:ln w="6350">
-            <a:solidFill>
-              <a:schemeClr val="tx1"/>
-            </a:solidFill>
+            <a:noFill/>
           </a:ln>
         </p:spPr>
         <p:style>
@@ -9258,9 +9221,7 @@
           </a:prstGeom>
           <a:noFill/>
           <a:ln w="6350">
-            <a:solidFill>
-              <a:schemeClr val="tx1"/>
-            </a:solidFill>
+            <a:noFill/>
           </a:ln>
         </p:spPr>
         <p:style>
@@ -9314,6 +9275,4083 @@
 </file>
 
 <file path=ppt/slides/slide2.xml><?xml version="1.0" encoding="utf-8"?>
+<p:sld xmlns:a="http://schemas.openxmlformats.org/drawingml/2006/main" xmlns:r="http://schemas.openxmlformats.org/officeDocument/2006/relationships" xmlns:p="http://schemas.openxmlformats.org/presentationml/2006/main">
+  <p:cSld>
+    <p:spTree>
+      <p:nvGrpSpPr>
+        <p:cNvPr id="1" name="">
+          <a:extLst>
+            <a:ext uri="{FF2B5EF4-FFF2-40B4-BE49-F238E27FC236}">
+              <a16:creationId xmlns:a16="http://schemas.microsoft.com/office/drawing/2014/main" id="{69092BC0-0A5D-F5D7-ECE0-DEE628606E33}"/>
+            </a:ext>
+          </a:extLst>
+        </p:cNvPr>
+        <p:cNvGrpSpPr/>
+        <p:nvPr/>
+      </p:nvGrpSpPr>
+      <p:grpSpPr>
+        <a:xfrm>
+          <a:off x="0" y="0"/>
+          <a:ext cx="0" cy="0"/>
+          <a:chOff x="0" y="0"/>
+          <a:chExt cx="0" cy="0"/>
+        </a:xfrm>
+      </p:grpSpPr>
+      <p:sp>
+        <p:nvSpPr>
+          <p:cNvPr id="4" name="Google Shape;446;p31">
+            <a:extLst>
+              <a:ext uri="{FF2B5EF4-FFF2-40B4-BE49-F238E27FC236}">
+                <a16:creationId xmlns:a16="http://schemas.microsoft.com/office/drawing/2014/main" id="{989E4F9E-1675-750A-889D-B9B5F8572FE5}"/>
+              </a:ext>
+            </a:extLst>
+          </p:cNvPr>
+          <p:cNvSpPr>
+            <a:spLocks/>
+          </p:cNvSpPr>
+          <p:nvPr/>
+        </p:nvSpPr>
+        <p:spPr>
+          <a:xfrm>
+            <a:off x="3189360" y="142541"/>
+            <a:ext cx="1702753" cy="4315157"/>
+          </a:xfrm>
+          <a:prstGeom prst="roundRect">
+            <a:avLst>
+              <a:gd name="adj" fmla="val 5609"/>
+            </a:avLst>
+          </a:prstGeom>
+          <a:solidFill>
+            <a:srgbClr val="FFCCCC"/>
+          </a:solidFill>
+          <a:ln w="19050" cap="flat" cmpd="sng">
+            <a:solidFill>
+              <a:srgbClr val="FF9999"/>
+            </a:solidFill>
+            <a:prstDash val="solid"/>
+            <a:miter lim="800000"/>
+            <a:headEnd type="none" w="sm" len="sm"/>
+            <a:tailEnd type="none" w="sm" len="sm"/>
+          </a:ln>
+        </p:spPr>
+        <p:txBody>
+          <a:bodyPr spcFirstLastPara="1" wrap="square" lIns="91433" tIns="45700" rIns="91433" bIns="45700" anchor="ctr" anchorCtr="0">
+            <a:noAutofit/>
+          </a:bodyPr>
+          <a:lstStyle/>
+          <a:p>
+            <a:pPr algn="ctr">
+              <a:lnSpc>
+                <a:spcPct val="150000"/>
+              </a:lnSpc>
+            </a:pPr>
+            <a:endParaRPr lang="en-US" sz="1400" b="1" dirty="0">
+              <a:solidFill>
+                <a:schemeClr val="dk1"/>
+              </a:solidFill>
+              <a:latin typeface="Malgun Gothic"/>
+              <a:ea typeface="Malgun Gothic"/>
+              <a:cs typeface="Malgun Gothic"/>
+              <a:sym typeface="Malgun Gothic"/>
+            </a:endParaRPr>
+          </a:p>
+          <a:p>
+            <a:pPr algn="ctr">
+              <a:lnSpc>
+                <a:spcPct val="150000"/>
+              </a:lnSpc>
+            </a:pPr>
+            <a:r>
+              <a:rPr lang="en-US" sz="1400" b="1" dirty="0">
+                <a:solidFill>
+                  <a:schemeClr val="dk1"/>
+                </a:solidFill>
+                <a:latin typeface="Malgun Gothic"/>
+                <a:ea typeface="Malgun Gothic"/>
+                <a:cs typeface="Malgun Gothic"/>
+                <a:sym typeface="Malgun Gothic"/>
+              </a:rPr>
+              <a:t>PMIC</a:t>
+            </a:r>
+          </a:p>
+          <a:p>
+            <a:pPr algn="ctr">
+              <a:lnSpc>
+                <a:spcPct val="150000"/>
+              </a:lnSpc>
+            </a:pPr>
+            <a:r>
+              <a:rPr lang="en-US" sz="1067" dirty="0">
+                <a:solidFill>
+                  <a:srgbClr val="000000"/>
+                </a:solidFill>
+                <a:latin typeface="Malgun Gothic"/>
+                <a:ea typeface="Malgun Gothic"/>
+                <a:sym typeface="Malgun Gothic"/>
+              </a:rPr>
+              <a:t>(TPS65217DRSLR)</a:t>
+            </a:r>
+          </a:p>
+          <a:p>
+            <a:pPr algn="ctr">
+              <a:lnSpc>
+                <a:spcPct val="150000"/>
+              </a:lnSpc>
+            </a:pPr>
+            <a:endParaRPr lang="en-US" sz="1067" dirty="0">
+              <a:solidFill>
+                <a:srgbClr val="000000"/>
+              </a:solidFill>
+              <a:latin typeface="Malgun Gothic"/>
+              <a:ea typeface="Malgun Gothic"/>
+              <a:sym typeface="Malgun Gothic"/>
+            </a:endParaRPr>
+          </a:p>
+          <a:p>
+            <a:pPr algn="ctr">
+              <a:lnSpc>
+                <a:spcPct val="150000"/>
+              </a:lnSpc>
+            </a:pPr>
+            <a:endParaRPr sz="1067" dirty="0">
+              <a:solidFill>
+                <a:srgbClr val="000000"/>
+              </a:solidFill>
+              <a:latin typeface="Malgun Gothic"/>
+              <a:ea typeface="Malgun Gothic"/>
+              <a:sym typeface="Malgun Gothic"/>
+            </a:endParaRPr>
+          </a:p>
+        </p:txBody>
+      </p:sp>
+      <p:sp>
+        <p:nvSpPr>
+          <p:cNvPr id="5" name="Google Shape;509;p32">
+            <a:extLst>
+              <a:ext uri="{FF2B5EF4-FFF2-40B4-BE49-F238E27FC236}">
+                <a16:creationId xmlns:a16="http://schemas.microsoft.com/office/drawing/2014/main" id="{E381203C-4BE8-260D-D87F-D23C2B42C535}"/>
+              </a:ext>
+            </a:extLst>
+          </p:cNvPr>
+          <p:cNvSpPr>
+            <a:spLocks noGrp="1" noRot="1" noMove="1" noResize="1" noEditPoints="1" noAdjustHandles="1" noChangeArrowheads="1" noChangeShapeType="1"/>
+          </p:cNvSpPr>
+          <p:nvPr/>
+        </p:nvSpPr>
+        <p:spPr>
+          <a:xfrm>
+            <a:off x="8964230" y="142540"/>
+            <a:ext cx="1702753" cy="4967340"/>
+          </a:xfrm>
+          <a:prstGeom prst="roundRect">
+            <a:avLst>
+              <a:gd name="adj" fmla="val 7831"/>
+            </a:avLst>
+          </a:prstGeom>
+          <a:solidFill>
+            <a:srgbClr val="CCCCFF"/>
+          </a:solidFill>
+          <a:ln w="19050" cap="flat" cmpd="sng">
+            <a:solidFill>
+              <a:srgbClr val="9966FF"/>
+            </a:solidFill>
+            <a:prstDash val="solid"/>
+            <a:miter lim="800000"/>
+            <a:headEnd type="none" w="sm" len="sm"/>
+            <a:tailEnd type="none" w="sm" len="sm"/>
+          </a:ln>
+        </p:spPr>
+        <p:txBody>
+          <a:bodyPr spcFirstLastPara="1" wrap="square" lIns="91433" tIns="45700" rIns="91433" bIns="45700" anchor="ctr" anchorCtr="0">
+            <a:noAutofit/>
+          </a:bodyPr>
+          <a:lstStyle/>
+          <a:p>
+            <a:pPr algn="ctr">
+              <a:lnSpc>
+                <a:spcPct val="150000"/>
+              </a:lnSpc>
+            </a:pPr>
+            <a:r>
+              <a:rPr lang="en-US" sz="1400" b="1" dirty="0">
+                <a:solidFill>
+                  <a:schemeClr val="dk1"/>
+                </a:solidFill>
+                <a:latin typeface="Malgun Gothic"/>
+                <a:ea typeface="Malgun Gothic"/>
+                <a:sym typeface="Malgun Gothic"/>
+              </a:rPr>
+              <a:t>MCU</a:t>
+            </a:r>
+            <a:endParaRPr sz="1400" dirty="0"/>
+          </a:p>
+          <a:p>
+            <a:pPr algn="ctr">
+              <a:lnSpc>
+                <a:spcPct val="150000"/>
+              </a:lnSpc>
+            </a:pPr>
+            <a:r>
+              <a:rPr lang="en-US" altLang="ko" sz="1067" dirty="0">
+                <a:solidFill>
+                  <a:srgbClr val="000000"/>
+                </a:solidFill>
+                <a:latin typeface="Malgun Gothic"/>
+                <a:ea typeface="Malgun Gothic"/>
+                <a:cs typeface="Malgun Gothic"/>
+                <a:sym typeface="Malgun Gothic"/>
+              </a:rPr>
+              <a:t>(STM32C011F6U6TR)</a:t>
+            </a:r>
+          </a:p>
+          <a:p>
+            <a:pPr algn="ctr">
+              <a:lnSpc>
+                <a:spcPct val="150000"/>
+              </a:lnSpc>
+            </a:pPr>
+            <a:endParaRPr sz="1067" dirty="0">
+              <a:solidFill>
+                <a:srgbClr val="000000"/>
+              </a:solidFill>
+              <a:latin typeface="Malgun Gothic"/>
+              <a:ea typeface="Malgun Gothic"/>
+              <a:cs typeface="Malgun Gothic"/>
+              <a:sym typeface="Malgun Gothic"/>
+            </a:endParaRPr>
+          </a:p>
+        </p:txBody>
+      </p:sp>
+      <p:sp>
+        <p:nvSpPr>
+          <p:cNvPr id="7" name="Google Shape;443;p31">
+            <a:extLst>
+              <a:ext uri="{FF2B5EF4-FFF2-40B4-BE49-F238E27FC236}">
+                <a16:creationId xmlns:a16="http://schemas.microsoft.com/office/drawing/2014/main" id="{C75DF195-70CB-3E3F-32F7-749AA5F3F1A8}"/>
+              </a:ext>
+            </a:extLst>
+          </p:cNvPr>
+          <p:cNvSpPr/>
+          <p:nvPr/>
+        </p:nvSpPr>
+        <p:spPr>
+          <a:xfrm>
+            <a:off x="5867776" y="142543"/>
+            <a:ext cx="1267500" cy="603191"/>
+          </a:xfrm>
+          <a:prstGeom prst="roundRect">
+            <a:avLst>
+              <a:gd name="adj" fmla="val 11823"/>
+            </a:avLst>
+          </a:prstGeom>
+          <a:solidFill>
+            <a:srgbClr val="FFD5FF"/>
+          </a:solidFill>
+          <a:ln w="19050" cap="flat" cmpd="sng">
+            <a:solidFill>
+              <a:srgbClr val="FFB9FF"/>
+            </a:solidFill>
+            <a:prstDash val="solid"/>
+            <a:miter lim="800000"/>
+            <a:headEnd type="none" w="sm" len="sm"/>
+            <a:tailEnd type="none" w="sm" len="sm"/>
+          </a:ln>
+        </p:spPr>
+        <p:txBody>
+          <a:bodyPr spcFirstLastPara="1" wrap="square" lIns="91433" tIns="45700" rIns="91433" bIns="45700" anchor="ctr" anchorCtr="0">
+            <a:noAutofit/>
+          </a:bodyPr>
+          <a:lstStyle/>
+          <a:p>
+            <a:pPr algn="ctr">
+              <a:lnSpc>
+                <a:spcPct val="150000"/>
+              </a:lnSpc>
+            </a:pPr>
+            <a:r>
+              <a:rPr lang="en-US" altLang="ko-KR" sz="1200" b="1" dirty="0">
+                <a:solidFill>
+                  <a:schemeClr val="dk1"/>
+                </a:solidFill>
+                <a:latin typeface="Malgun Gothic"/>
+                <a:ea typeface="Malgun Gothic"/>
+                <a:cs typeface="Malgun Gothic"/>
+                <a:sym typeface="Malgun Gothic"/>
+              </a:rPr>
+              <a:t>3.3V LDO1</a:t>
+            </a:r>
+          </a:p>
+          <a:p>
+            <a:pPr algn="ctr">
+              <a:lnSpc>
+                <a:spcPct val="150000"/>
+              </a:lnSpc>
+            </a:pPr>
+            <a:r>
+              <a:rPr lang="en-US" altLang="ko-KR" sz="1000" dirty="0">
+                <a:solidFill>
+                  <a:srgbClr val="000000"/>
+                </a:solidFill>
+                <a:latin typeface="Malgun Gothic"/>
+                <a:ea typeface="Malgun Gothic"/>
+                <a:sym typeface="Malgun Gothic"/>
+              </a:rPr>
+              <a:t>(MIC5209YM-TR)</a:t>
+            </a:r>
+          </a:p>
+        </p:txBody>
+      </p:sp>
+      <p:sp>
+        <p:nvSpPr>
+          <p:cNvPr id="8" name="Google Shape;443;p31">
+            <a:extLst>
+              <a:ext uri="{FF2B5EF4-FFF2-40B4-BE49-F238E27FC236}">
+                <a16:creationId xmlns:a16="http://schemas.microsoft.com/office/drawing/2014/main" id="{A2E23C7D-51CC-C984-B1EF-1B796322C57E}"/>
+              </a:ext>
+            </a:extLst>
+          </p:cNvPr>
+          <p:cNvSpPr/>
+          <p:nvPr/>
+        </p:nvSpPr>
+        <p:spPr>
+          <a:xfrm>
+            <a:off x="5867776" y="866443"/>
+            <a:ext cx="1267500" cy="603191"/>
+          </a:xfrm>
+          <a:prstGeom prst="roundRect">
+            <a:avLst>
+              <a:gd name="adj" fmla="val 11823"/>
+            </a:avLst>
+          </a:prstGeom>
+          <a:solidFill>
+            <a:srgbClr val="FFD5FF"/>
+          </a:solidFill>
+          <a:ln w="19050" cap="flat" cmpd="sng">
+            <a:solidFill>
+              <a:srgbClr val="FFB9FF"/>
+            </a:solidFill>
+            <a:prstDash val="solid"/>
+            <a:miter lim="800000"/>
+            <a:headEnd type="none" w="sm" len="sm"/>
+            <a:tailEnd type="none" w="sm" len="sm"/>
+          </a:ln>
+        </p:spPr>
+        <p:txBody>
+          <a:bodyPr spcFirstLastPara="1" wrap="square" lIns="91433" tIns="45700" rIns="91433" bIns="45700" anchor="ctr" anchorCtr="0">
+            <a:noAutofit/>
+          </a:bodyPr>
+          <a:lstStyle/>
+          <a:p>
+            <a:pPr algn="ctr">
+              <a:lnSpc>
+                <a:spcPct val="150000"/>
+              </a:lnSpc>
+            </a:pPr>
+            <a:r>
+              <a:rPr lang="en-US" altLang="ko-KR" sz="1200" b="1" dirty="0">
+                <a:solidFill>
+                  <a:schemeClr val="dk1"/>
+                </a:solidFill>
+                <a:latin typeface="Malgun Gothic"/>
+                <a:ea typeface="Malgun Gothic"/>
+                <a:cs typeface="Malgun Gothic"/>
+                <a:sym typeface="Malgun Gothic"/>
+              </a:rPr>
+              <a:t>3.3V LDO2</a:t>
+            </a:r>
+          </a:p>
+          <a:p>
+            <a:pPr algn="ctr">
+              <a:lnSpc>
+                <a:spcPct val="150000"/>
+              </a:lnSpc>
+            </a:pPr>
+            <a:r>
+              <a:rPr lang="en-US" altLang="ko-KR" sz="1000" dirty="0">
+                <a:solidFill>
+                  <a:srgbClr val="000000"/>
+                </a:solidFill>
+                <a:latin typeface="Malgun Gothic"/>
+                <a:ea typeface="Malgun Gothic"/>
+                <a:sym typeface="Malgun Gothic"/>
+              </a:rPr>
+              <a:t>(AM1117-3.3)</a:t>
+            </a:r>
+          </a:p>
+        </p:txBody>
+      </p:sp>
+      <p:sp>
+        <p:nvSpPr>
+          <p:cNvPr id="9" name="Google Shape;441;p31">
+            <a:extLst>
+              <a:ext uri="{FF2B5EF4-FFF2-40B4-BE49-F238E27FC236}">
+                <a16:creationId xmlns:a16="http://schemas.microsoft.com/office/drawing/2014/main" id="{83CC65CB-B694-B131-2490-951423610325}"/>
+              </a:ext>
+            </a:extLst>
+          </p:cNvPr>
+          <p:cNvSpPr/>
+          <p:nvPr/>
+        </p:nvSpPr>
+        <p:spPr>
+          <a:xfrm>
+            <a:off x="2236490" y="4974632"/>
+            <a:ext cx="1702752" cy="689200"/>
+          </a:xfrm>
+          <a:prstGeom prst="roundRect">
+            <a:avLst>
+              <a:gd name="adj" fmla="val 12159"/>
+            </a:avLst>
+          </a:prstGeom>
+          <a:solidFill>
+            <a:srgbClr val="F6F4EA"/>
+          </a:solidFill>
+          <a:ln w="19050" cap="flat" cmpd="sng">
+            <a:solidFill>
+              <a:srgbClr val="E1DABD"/>
+            </a:solidFill>
+            <a:prstDash val="solid"/>
+            <a:miter lim="800000"/>
+            <a:headEnd type="none" w="sm" len="sm"/>
+            <a:tailEnd type="none" w="sm" len="sm"/>
+          </a:ln>
+        </p:spPr>
+        <p:txBody>
+          <a:bodyPr spcFirstLastPara="1" wrap="square" lIns="91433" tIns="45700" rIns="91433" bIns="45700" anchor="ctr" anchorCtr="0">
+            <a:noAutofit/>
+          </a:bodyPr>
+          <a:lstStyle/>
+          <a:p>
+            <a:pPr algn="ctr">
+              <a:lnSpc>
+                <a:spcPct val="150000"/>
+              </a:lnSpc>
+            </a:pPr>
+            <a:r>
+              <a:rPr lang="en-US" altLang="ko-KR" sz="1200" b="1" dirty="0">
+                <a:solidFill>
+                  <a:schemeClr val="dk1"/>
+                </a:solidFill>
+                <a:latin typeface="Malgun Gothic"/>
+                <a:ea typeface="Malgun Gothic"/>
+                <a:cs typeface="Malgun Gothic"/>
+                <a:sym typeface="Malgun Gothic"/>
+              </a:rPr>
+              <a:t>PMIC Output Rails</a:t>
+            </a:r>
+          </a:p>
+          <a:p>
+            <a:pPr algn="ctr">
+              <a:lnSpc>
+                <a:spcPct val="150000"/>
+              </a:lnSpc>
+            </a:pPr>
+            <a:r>
+              <a:rPr lang="en-US" altLang="ko-KR" sz="1200" dirty="0">
+                <a:solidFill>
+                  <a:schemeClr val="dk1"/>
+                </a:solidFill>
+                <a:latin typeface="Malgun Gothic"/>
+                <a:ea typeface="Malgun Gothic"/>
+                <a:cs typeface="Malgun Gothic"/>
+                <a:sym typeface="Malgun Gothic"/>
+              </a:rPr>
+              <a:t>(Connector)</a:t>
+            </a:r>
+          </a:p>
+        </p:txBody>
+      </p:sp>
+      <p:sp>
+        <p:nvSpPr>
+          <p:cNvPr id="11" name="Google Shape;447;p31">
+            <a:extLst>
+              <a:ext uri="{FF2B5EF4-FFF2-40B4-BE49-F238E27FC236}">
+                <a16:creationId xmlns:a16="http://schemas.microsoft.com/office/drawing/2014/main" id="{027DB8DC-28DE-C971-D754-CA14FED7BEB1}"/>
+              </a:ext>
+            </a:extLst>
+          </p:cNvPr>
+          <p:cNvSpPr/>
+          <p:nvPr/>
+        </p:nvSpPr>
+        <p:spPr>
+          <a:xfrm>
+            <a:off x="946197" y="1901576"/>
+            <a:ext cx="1267500" cy="526798"/>
+          </a:xfrm>
+          <a:prstGeom prst="roundRect">
+            <a:avLst>
+              <a:gd name="adj" fmla="val 13030"/>
+            </a:avLst>
+          </a:prstGeom>
+          <a:solidFill>
+            <a:srgbClr val="FFEDC1"/>
+          </a:solidFill>
+          <a:ln w="19050" cap="flat" cmpd="sng">
+            <a:solidFill>
+              <a:srgbClr val="FFDC85"/>
+            </a:solidFill>
+            <a:prstDash val="solid"/>
+            <a:miter lim="800000"/>
+            <a:headEnd type="none" w="sm" len="sm"/>
+            <a:tailEnd type="none" w="sm" len="sm"/>
+          </a:ln>
+        </p:spPr>
+        <p:txBody>
+          <a:bodyPr spcFirstLastPara="1" wrap="square" lIns="91433" tIns="45700" rIns="91433" bIns="45700" anchor="ctr" anchorCtr="0">
+            <a:noAutofit/>
+          </a:bodyPr>
+          <a:lstStyle/>
+          <a:p>
+            <a:pPr algn="ctr">
+              <a:lnSpc>
+                <a:spcPct val="150000"/>
+              </a:lnSpc>
+            </a:pPr>
+            <a:r>
+              <a:rPr lang="en-US" altLang="ko-KR" sz="900" b="1" dirty="0">
+                <a:solidFill>
+                  <a:schemeClr val="tx1"/>
+                </a:solidFill>
+              </a:rPr>
+              <a:t>PMIC Power-On</a:t>
+            </a:r>
+          </a:p>
+          <a:p>
+            <a:pPr algn="ctr">
+              <a:lnSpc>
+                <a:spcPct val="150000"/>
+              </a:lnSpc>
+            </a:pPr>
+            <a:r>
+              <a:rPr lang="en-US" altLang="ko-KR" sz="900" b="1" dirty="0">
+                <a:solidFill>
+                  <a:schemeClr val="tx1"/>
+                </a:solidFill>
+              </a:rPr>
+              <a:t>(Push-Button 1)</a:t>
+            </a:r>
+            <a:endParaRPr lang="en-US" altLang="ko-KR" sz="600" dirty="0">
+              <a:solidFill>
+                <a:schemeClr val="tx1"/>
+              </a:solidFill>
+            </a:endParaRPr>
+          </a:p>
+        </p:txBody>
+      </p:sp>
+      <p:cxnSp>
+        <p:nvCxnSpPr>
+          <p:cNvPr id="14" name="직선 화살표 연결선 13">
+            <a:extLst>
+              <a:ext uri="{FF2B5EF4-FFF2-40B4-BE49-F238E27FC236}">
+                <a16:creationId xmlns:a16="http://schemas.microsoft.com/office/drawing/2014/main" id="{5FBE704B-FC56-65E9-34FB-FC79B19520E0}"/>
+              </a:ext>
+            </a:extLst>
+          </p:cNvPr>
+          <p:cNvCxnSpPr>
+            <a:cxnSpLocks/>
+          </p:cNvCxnSpPr>
+          <p:nvPr/>
+        </p:nvCxnSpPr>
+        <p:spPr>
+          <a:xfrm>
+            <a:off x="2282189" y="447946"/>
+            <a:ext cx="835661" cy="0"/>
+          </a:xfrm>
+          <a:prstGeom prst="straightConnector1">
+            <a:avLst/>
+          </a:prstGeom>
+          <a:ln w="15875">
+            <a:solidFill>
+              <a:schemeClr val="tx1"/>
+            </a:solidFill>
+            <a:tailEnd type="triangle"/>
+          </a:ln>
+        </p:spPr>
+        <p:style>
+          <a:lnRef idx="1">
+            <a:schemeClr val="accent1"/>
+          </a:lnRef>
+          <a:fillRef idx="0">
+            <a:schemeClr val="accent1"/>
+          </a:fillRef>
+          <a:effectRef idx="0">
+            <a:schemeClr val="accent1"/>
+          </a:effectRef>
+          <a:fontRef idx="minor">
+            <a:schemeClr val="tx1"/>
+          </a:fontRef>
+        </p:style>
+      </p:cxnSp>
+      <p:sp>
+        <p:nvSpPr>
+          <p:cNvPr id="15" name="사각형: 둥근 모서리 14">
+            <a:extLst>
+              <a:ext uri="{FF2B5EF4-FFF2-40B4-BE49-F238E27FC236}">
+                <a16:creationId xmlns:a16="http://schemas.microsoft.com/office/drawing/2014/main" id="{15937B56-FBA5-8085-7F7E-BD5CD8C49DDD}"/>
+              </a:ext>
+            </a:extLst>
+          </p:cNvPr>
+          <p:cNvSpPr>
+            <a:spLocks/>
+          </p:cNvSpPr>
+          <p:nvPr/>
+        </p:nvSpPr>
+        <p:spPr>
+          <a:xfrm>
+            <a:off x="946196" y="142541"/>
+            <a:ext cx="1267500" cy="603193"/>
+          </a:xfrm>
+          <a:prstGeom prst="roundRect">
+            <a:avLst>
+              <a:gd name="adj" fmla="val 7649"/>
+            </a:avLst>
+          </a:prstGeom>
+          <a:solidFill>
+            <a:srgbClr val="EAEAEA"/>
+          </a:solidFill>
+          <a:ln>
+            <a:solidFill>
+              <a:schemeClr val="bg1">
+                <a:lumMod val="75000"/>
+              </a:schemeClr>
+            </a:solidFill>
+          </a:ln>
+        </p:spPr>
+        <p:style>
+          <a:lnRef idx="2">
+            <a:schemeClr val="accent1">
+              <a:shade val="15000"/>
+            </a:schemeClr>
+          </a:lnRef>
+          <a:fillRef idx="1">
+            <a:schemeClr val="accent1"/>
+          </a:fillRef>
+          <a:effectRef idx="0">
+            <a:schemeClr val="accent1"/>
+          </a:effectRef>
+          <a:fontRef idx="minor">
+            <a:schemeClr val="lt1"/>
+          </a:fontRef>
+        </p:style>
+        <p:txBody>
+          <a:bodyPr vert="horz" rtlCol="0" anchor="ctr"/>
+          <a:lstStyle/>
+          <a:p>
+            <a:pPr algn="ctr">
+              <a:lnSpc>
+                <a:spcPct val="150000"/>
+              </a:lnSpc>
+            </a:pPr>
+            <a:r>
+              <a:rPr lang="en-US" altLang="ko-KR" sz="1200" b="1" dirty="0">
+                <a:solidFill>
+                  <a:schemeClr val="tx1"/>
+                </a:solidFill>
+              </a:rPr>
+              <a:t>Power Input 1</a:t>
+            </a:r>
+          </a:p>
+          <a:p>
+            <a:pPr algn="ctr">
+              <a:lnSpc>
+                <a:spcPct val="150000"/>
+              </a:lnSpc>
+            </a:pPr>
+            <a:r>
+              <a:rPr lang="en-US" altLang="ko-KR" sz="1000" dirty="0">
+                <a:solidFill>
+                  <a:schemeClr val="tx1"/>
+                </a:solidFill>
+              </a:rPr>
+              <a:t>(DC Barrel Jack)</a:t>
+            </a:r>
+          </a:p>
+        </p:txBody>
+      </p:sp>
+      <p:sp>
+        <p:nvSpPr>
+          <p:cNvPr id="16" name="사각형: 둥근 모서리 15">
+            <a:extLst>
+              <a:ext uri="{FF2B5EF4-FFF2-40B4-BE49-F238E27FC236}">
+                <a16:creationId xmlns:a16="http://schemas.microsoft.com/office/drawing/2014/main" id="{29BABBDC-DB3A-22BE-4517-5CE8C5EAE1E4}"/>
+              </a:ext>
+            </a:extLst>
+          </p:cNvPr>
+          <p:cNvSpPr>
+            <a:spLocks/>
+          </p:cNvSpPr>
+          <p:nvPr/>
+        </p:nvSpPr>
+        <p:spPr>
+          <a:xfrm>
+            <a:off x="946196" y="866441"/>
+            <a:ext cx="1267500" cy="603193"/>
+          </a:xfrm>
+          <a:prstGeom prst="roundRect">
+            <a:avLst>
+              <a:gd name="adj" fmla="val 7649"/>
+            </a:avLst>
+          </a:prstGeom>
+          <a:solidFill>
+            <a:srgbClr val="EAEAEA"/>
+          </a:solidFill>
+          <a:ln>
+            <a:solidFill>
+              <a:schemeClr val="bg1">
+                <a:lumMod val="75000"/>
+              </a:schemeClr>
+            </a:solidFill>
+          </a:ln>
+        </p:spPr>
+        <p:style>
+          <a:lnRef idx="2">
+            <a:schemeClr val="accent1">
+              <a:shade val="15000"/>
+            </a:schemeClr>
+          </a:lnRef>
+          <a:fillRef idx="1">
+            <a:schemeClr val="accent1"/>
+          </a:fillRef>
+          <a:effectRef idx="0">
+            <a:schemeClr val="accent1"/>
+          </a:effectRef>
+          <a:fontRef idx="minor">
+            <a:schemeClr val="lt1"/>
+          </a:fontRef>
+        </p:style>
+        <p:txBody>
+          <a:bodyPr vert="horz" rtlCol="0" anchor="ctr"/>
+          <a:lstStyle/>
+          <a:p>
+            <a:pPr algn="ctr">
+              <a:lnSpc>
+                <a:spcPct val="150000"/>
+              </a:lnSpc>
+            </a:pPr>
+            <a:r>
+              <a:rPr lang="en-US" altLang="ko-KR" sz="1200" b="1" dirty="0">
+                <a:solidFill>
+                  <a:schemeClr val="tx1"/>
+                </a:solidFill>
+              </a:rPr>
+              <a:t>Power Input 2</a:t>
+            </a:r>
+          </a:p>
+          <a:p>
+            <a:pPr algn="ctr">
+              <a:lnSpc>
+                <a:spcPct val="150000"/>
+              </a:lnSpc>
+            </a:pPr>
+            <a:r>
+              <a:rPr lang="en-US" altLang="ko-KR" sz="1000" dirty="0">
+                <a:solidFill>
+                  <a:schemeClr val="tx1"/>
+                </a:solidFill>
+              </a:rPr>
+              <a:t>(USB-C Conn.)</a:t>
+            </a:r>
+          </a:p>
+        </p:txBody>
+      </p:sp>
+      <p:cxnSp>
+        <p:nvCxnSpPr>
+          <p:cNvPr id="21" name="직선 화살표 연결선 20">
+            <a:extLst>
+              <a:ext uri="{FF2B5EF4-FFF2-40B4-BE49-F238E27FC236}">
+                <a16:creationId xmlns:a16="http://schemas.microsoft.com/office/drawing/2014/main" id="{2955FC57-01F0-2C4F-F677-124C40734B75}"/>
+              </a:ext>
+            </a:extLst>
+          </p:cNvPr>
+          <p:cNvCxnSpPr>
+            <a:cxnSpLocks/>
+          </p:cNvCxnSpPr>
+          <p:nvPr/>
+        </p:nvCxnSpPr>
+        <p:spPr>
+          <a:xfrm>
+            <a:off x="2282189" y="1148037"/>
+            <a:ext cx="835661" cy="0"/>
+          </a:xfrm>
+          <a:prstGeom prst="straightConnector1">
+            <a:avLst/>
+          </a:prstGeom>
+          <a:ln w="15875">
+            <a:solidFill>
+              <a:schemeClr val="tx1"/>
+            </a:solidFill>
+            <a:tailEnd type="triangle"/>
+          </a:ln>
+        </p:spPr>
+        <p:style>
+          <a:lnRef idx="1">
+            <a:schemeClr val="accent1"/>
+          </a:lnRef>
+          <a:fillRef idx="0">
+            <a:schemeClr val="accent1"/>
+          </a:fillRef>
+          <a:effectRef idx="0">
+            <a:schemeClr val="accent1"/>
+          </a:effectRef>
+          <a:fontRef idx="minor">
+            <a:schemeClr val="tx1"/>
+          </a:fontRef>
+        </p:style>
+      </p:cxnSp>
+      <p:sp>
+        <p:nvSpPr>
+          <p:cNvPr id="22" name="Google Shape;447;p31">
+            <a:extLst>
+              <a:ext uri="{FF2B5EF4-FFF2-40B4-BE49-F238E27FC236}">
+                <a16:creationId xmlns:a16="http://schemas.microsoft.com/office/drawing/2014/main" id="{A1D10097-15EC-F734-9E43-8C2BB042C3C2}"/>
+              </a:ext>
+            </a:extLst>
+          </p:cNvPr>
+          <p:cNvSpPr/>
+          <p:nvPr/>
+        </p:nvSpPr>
+        <p:spPr>
+          <a:xfrm>
+            <a:off x="946196" y="2746355"/>
+            <a:ext cx="1267500" cy="526798"/>
+          </a:xfrm>
+          <a:prstGeom prst="roundRect">
+            <a:avLst>
+              <a:gd name="adj" fmla="val 13030"/>
+            </a:avLst>
+          </a:prstGeom>
+          <a:solidFill>
+            <a:srgbClr val="FFEDC1"/>
+          </a:solidFill>
+          <a:ln w="19050" cap="flat" cmpd="sng">
+            <a:solidFill>
+              <a:srgbClr val="FFDC85"/>
+            </a:solidFill>
+            <a:prstDash val="solid"/>
+            <a:miter lim="800000"/>
+            <a:headEnd type="none" w="sm" len="sm"/>
+            <a:tailEnd type="none" w="sm" len="sm"/>
+          </a:ln>
+        </p:spPr>
+        <p:txBody>
+          <a:bodyPr spcFirstLastPara="1" wrap="square" lIns="91433" tIns="45700" rIns="91433" bIns="45700" anchor="ctr" anchorCtr="0">
+            <a:noAutofit/>
+          </a:bodyPr>
+          <a:lstStyle/>
+          <a:p>
+            <a:pPr algn="ctr">
+              <a:lnSpc>
+                <a:spcPct val="150000"/>
+              </a:lnSpc>
+            </a:pPr>
+            <a:r>
+              <a:rPr lang="en-US" altLang="ko-KR" sz="900" b="1" dirty="0">
+                <a:solidFill>
+                  <a:schemeClr val="tx1"/>
+                </a:solidFill>
+              </a:rPr>
+              <a:t>PMIC Reset</a:t>
+            </a:r>
+          </a:p>
+          <a:p>
+            <a:pPr algn="ctr">
+              <a:lnSpc>
+                <a:spcPct val="150000"/>
+              </a:lnSpc>
+            </a:pPr>
+            <a:r>
+              <a:rPr lang="en-US" altLang="ko-KR" sz="900" b="1" dirty="0"/>
+              <a:t>(Push-Button 2)</a:t>
+            </a:r>
+            <a:endParaRPr lang="en-US" altLang="ko-KR" sz="600" dirty="0">
+              <a:solidFill>
+                <a:schemeClr val="tx1"/>
+              </a:solidFill>
+            </a:endParaRPr>
+          </a:p>
+        </p:txBody>
+      </p:sp>
+      <p:sp>
+        <p:nvSpPr>
+          <p:cNvPr id="23" name="Google Shape;447;p31">
+            <a:extLst>
+              <a:ext uri="{FF2B5EF4-FFF2-40B4-BE49-F238E27FC236}">
+                <a16:creationId xmlns:a16="http://schemas.microsoft.com/office/drawing/2014/main" id="{EEB014D5-13EB-029B-F831-384AF52FB279}"/>
+              </a:ext>
+            </a:extLst>
+          </p:cNvPr>
+          <p:cNvSpPr/>
+          <p:nvPr/>
+        </p:nvSpPr>
+        <p:spPr>
+          <a:xfrm>
+            <a:off x="946196" y="3591134"/>
+            <a:ext cx="1267500" cy="526798"/>
+          </a:xfrm>
+          <a:prstGeom prst="roundRect">
+            <a:avLst>
+              <a:gd name="adj" fmla="val 13030"/>
+            </a:avLst>
+          </a:prstGeom>
+          <a:solidFill>
+            <a:srgbClr val="FFEDC1"/>
+          </a:solidFill>
+          <a:ln w="19050" cap="flat" cmpd="sng">
+            <a:solidFill>
+              <a:srgbClr val="FFDC85"/>
+            </a:solidFill>
+            <a:prstDash val="solid"/>
+            <a:miter lim="800000"/>
+            <a:headEnd type="none" w="sm" len="sm"/>
+            <a:tailEnd type="none" w="sm" len="sm"/>
+          </a:ln>
+        </p:spPr>
+        <p:txBody>
+          <a:bodyPr spcFirstLastPara="1" wrap="square" lIns="91433" tIns="45700" rIns="91433" bIns="45700" anchor="ctr" anchorCtr="0">
+            <a:noAutofit/>
+          </a:bodyPr>
+          <a:lstStyle/>
+          <a:p>
+            <a:pPr algn="ctr">
+              <a:lnSpc>
+                <a:spcPct val="150000"/>
+              </a:lnSpc>
+            </a:pPr>
+            <a:r>
+              <a:rPr lang="en-US" altLang="ko-KR" sz="900" b="1" dirty="0">
+                <a:solidFill>
+                  <a:schemeClr val="tx1"/>
+                </a:solidFill>
+              </a:rPr>
+              <a:t>PMIC Power En.</a:t>
+            </a:r>
+          </a:p>
+          <a:p>
+            <a:pPr algn="ctr">
+              <a:lnSpc>
+                <a:spcPct val="150000"/>
+              </a:lnSpc>
+            </a:pPr>
+            <a:r>
+              <a:rPr lang="en-US" altLang="ko-KR" sz="900" b="1" dirty="0"/>
+              <a:t>(Slide Switch 1)</a:t>
+            </a:r>
+            <a:endParaRPr lang="en-US" altLang="ko-KR" sz="600" dirty="0">
+              <a:solidFill>
+                <a:schemeClr val="tx1"/>
+              </a:solidFill>
+            </a:endParaRPr>
+          </a:p>
+        </p:txBody>
+      </p:sp>
+      <p:cxnSp>
+        <p:nvCxnSpPr>
+          <p:cNvPr id="25" name="직선 화살표 연결선 24">
+            <a:extLst>
+              <a:ext uri="{FF2B5EF4-FFF2-40B4-BE49-F238E27FC236}">
+                <a16:creationId xmlns:a16="http://schemas.microsoft.com/office/drawing/2014/main" id="{D033FF91-9F9F-96DD-7F89-7A87A72A0A40}"/>
+              </a:ext>
+            </a:extLst>
+          </p:cNvPr>
+          <p:cNvCxnSpPr>
+            <a:cxnSpLocks/>
+          </p:cNvCxnSpPr>
+          <p:nvPr/>
+        </p:nvCxnSpPr>
+        <p:spPr>
+          <a:xfrm>
+            <a:off x="4968239" y="444137"/>
+            <a:ext cx="835661" cy="0"/>
+          </a:xfrm>
+          <a:prstGeom prst="straightConnector1">
+            <a:avLst/>
+          </a:prstGeom>
+          <a:ln w="15875">
+            <a:solidFill>
+              <a:schemeClr val="tx1"/>
+            </a:solidFill>
+            <a:tailEnd type="triangle"/>
+          </a:ln>
+        </p:spPr>
+        <p:style>
+          <a:lnRef idx="1">
+            <a:schemeClr val="accent1"/>
+          </a:lnRef>
+          <a:fillRef idx="0">
+            <a:schemeClr val="accent1"/>
+          </a:fillRef>
+          <a:effectRef idx="0">
+            <a:schemeClr val="accent1"/>
+          </a:effectRef>
+          <a:fontRef idx="minor">
+            <a:schemeClr val="tx1"/>
+          </a:fontRef>
+        </p:style>
+      </p:cxnSp>
+      <p:cxnSp>
+        <p:nvCxnSpPr>
+          <p:cNvPr id="26" name="직선 화살표 연결선 25">
+            <a:extLst>
+              <a:ext uri="{FF2B5EF4-FFF2-40B4-BE49-F238E27FC236}">
+                <a16:creationId xmlns:a16="http://schemas.microsoft.com/office/drawing/2014/main" id="{0648F781-5E29-82F0-3158-F36DE9C062B6}"/>
+              </a:ext>
+            </a:extLst>
+          </p:cNvPr>
+          <p:cNvCxnSpPr>
+            <a:cxnSpLocks/>
+          </p:cNvCxnSpPr>
+          <p:nvPr/>
+        </p:nvCxnSpPr>
+        <p:spPr>
+          <a:xfrm>
+            <a:off x="5289550" y="1148037"/>
+            <a:ext cx="516010" cy="0"/>
+          </a:xfrm>
+          <a:prstGeom prst="straightConnector1">
+            <a:avLst/>
+          </a:prstGeom>
+          <a:ln w="15875">
+            <a:solidFill>
+              <a:schemeClr val="tx1"/>
+            </a:solidFill>
+            <a:tailEnd type="triangle"/>
+          </a:ln>
+        </p:spPr>
+        <p:style>
+          <a:lnRef idx="1">
+            <a:schemeClr val="accent1"/>
+          </a:lnRef>
+          <a:fillRef idx="0">
+            <a:schemeClr val="accent1"/>
+          </a:fillRef>
+          <a:effectRef idx="0">
+            <a:schemeClr val="accent1"/>
+          </a:effectRef>
+          <a:fontRef idx="minor">
+            <a:schemeClr val="tx1"/>
+          </a:fontRef>
+        </p:style>
+      </p:cxnSp>
+      <p:cxnSp>
+        <p:nvCxnSpPr>
+          <p:cNvPr id="28" name="직선 연결선 27">
+            <a:extLst>
+              <a:ext uri="{FF2B5EF4-FFF2-40B4-BE49-F238E27FC236}">
+                <a16:creationId xmlns:a16="http://schemas.microsoft.com/office/drawing/2014/main" id="{010C2362-D29B-BF93-AAA1-C57FE3D593BE}"/>
+              </a:ext>
+            </a:extLst>
+          </p:cNvPr>
+          <p:cNvCxnSpPr>
+            <a:cxnSpLocks/>
+          </p:cNvCxnSpPr>
+          <p:nvPr/>
+        </p:nvCxnSpPr>
+        <p:spPr>
+          <a:xfrm>
+            <a:off x="5289550" y="447450"/>
+            <a:ext cx="0" cy="700587"/>
+          </a:xfrm>
+          <a:prstGeom prst="line">
+            <a:avLst/>
+          </a:prstGeom>
+          <a:ln w="15875">
+            <a:solidFill>
+              <a:schemeClr val="tx1"/>
+            </a:solidFill>
+          </a:ln>
+        </p:spPr>
+        <p:style>
+          <a:lnRef idx="2">
+            <a:schemeClr val="accent1"/>
+          </a:lnRef>
+          <a:fillRef idx="0">
+            <a:schemeClr val="accent1"/>
+          </a:fillRef>
+          <a:effectRef idx="1">
+            <a:schemeClr val="accent1"/>
+          </a:effectRef>
+          <a:fontRef idx="minor">
+            <a:schemeClr val="tx1"/>
+          </a:fontRef>
+        </p:style>
+      </p:cxnSp>
+      <p:cxnSp>
+        <p:nvCxnSpPr>
+          <p:cNvPr id="34" name="직선 화살표 연결선 33">
+            <a:extLst>
+              <a:ext uri="{FF2B5EF4-FFF2-40B4-BE49-F238E27FC236}">
+                <a16:creationId xmlns:a16="http://schemas.microsoft.com/office/drawing/2014/main" id="{0D5187EA-4359-57A9-5D0C-247DA01C6A95}"/>
+              </a:ext>
+            </a:extLst>
+          </p:cNvPr>
+          <p:cNvCxnSpPr>
+            <a:cxnSpLocks/>
+          </p:cNvCxnSpPr>
+          <p:nvPr/>
+        </p:nvCxnSpPr>
+        <p:spPr>
+          <a:xfrm>
+            <a:off x="2282188" y="2164975"/>
+            <a:ext cx="835661" cy="0"/>
+          </a:xfrm>
+          <a:prstGeom prst="straightConnector1">
+            <a:avLst/>
+          </a:prstGeom>
+          <a:ln w="15875">
+            <a:solidFill>
+              <a:schemeClr val="tx1"/>
+            </a:solidFill>
+            <a:tailEnd type="triangle"/>
+          </a:ln>
+        </p:spPr>
+        <p:style>
+          <a:lnRef idx="1">
+            <a:schemeClr val="accent1"/>
+          </a:lnRef>
+          <a:fillRef idx="0">
+            <a:schemeClr val="accent1"/>
+          </a:fillRef>
+          <a:effectRef idx="0">
+            <a:schemeClr val="accent1"/>
+          </a:effectRef>
+          <a:fontRef idx="minor">
+            <a:schemeClr val="tx1"/>
+          </a:fontRef>
+        </p:style>
+      </p:cxnSp>
+      <p:cxnSp>
+        <p:nvCxnSpPr>
+          <p:cNvPr id="35" name="직선 화살표 연결선 34">
+            <a:extLst>
+              <a:ext uri="{FF2B5EF4-FFF2-40B4-BE49-F238E27FC236}">
+                <a16:creationId xmlns:a16="http://schemas.microsoft.com/office/drawing/2014/main" id="{55FAA818-FC62-D4BD-9665-077892E29AB4}"/>
+              </a:ext>
+            </a:extLst>
+          </p:cNvPr>
+          <p:cNvCxnSpPr>
+            <a:cxnSpLocks/>
+          </p:cNvCxnSpPr>
+          <p:nvPr/>
+        </p:nvCxnSpPr>
+        <p:spPr>
+          <a:xfrm>
+            <a:off x="2282188" y="3009754"/>
+            <a:ext cx="835661" cy="0"/>
+          </a:xfrm>
+          <a:prstGeom prst="straightConnector1">
+            <a:avLst/>
+          </a:prstGeom>
+          <a:ln w="15875">
+            <a:solidFill>
+              <a:schemeClr val="tx1"/>
+            </a:solidFill>
+            <a:tailEnd type="triangle"/>
+          </a:ln>
+        </p:spPr>
+        <p:style>
+          <a:lnRef idx="1">
+            <a:schemeClr val="accent1"/>
+          </a:lnRef>
+          <a:fillRef idx="0">
+            <a:schemeClr val="accent1"/>
+          </a:fillRef>
+          <a:effectRef idx="0">
+            <a:schemeClr val="accent1"/>
+          </a:effectRef>
+          <a:fontRef idx="minor">
+            <a:schemeClr val="tx1"/>
+          </a:fontRef>
+        </p:style>
+      </p:cxnSp>
+      <p:cxnSp>
+        <p:nvCxnSpPr>
+          <p:cNvPr id="36" name="직선 화살표 연결선 35">
+            <a:extLst>
+              <a:ext uri="{FF2B5EF4-FFF2-40B4-BE49-F238E27FC236}">
+                <a16:creationId xmlns:a16="http://schemas.microsoft.com/office/drawing/2014/main" id="{4850A21C-0524-5805-093D-6EAB5B2532AD}"/>
+              </a:ext>
+            </a:extLst>
+          </p:cNvPr>
+          <p:cNvCxnSpPr>
+            <a:cxnSpLocks/>
+          </p:cNvCxnSpPr>
+          <p:nvPr/>
+        </p:nvCxnSpPr>
+        <p:spPr>
+          <a:xfrm>
+            <a:off x="2282187" y="3820266"/>
+            <a:ext cx="835661" cy="0"/>
+          </a:xfrm>
+          <a:prstGeom prst="straightConnector1">
+            <a:avLst/>
+          </a:prstGeom>
+          <a:ln w="15875">
+            <a:solidFill>
+              <a:schemeClr val="tx1"/>
+            </a:solidFill>
+            <a:tailEnd type="triangle"/>
+          </a:ln>
+        </p:spPr>
+        <p:style>
+          <a:lnRef idx="1">
+            <a:schemeClr val="accent1"/>
+          </a:lnRef>
+          <a:fillRef idx="0">
+            <a:schemeClr val="accent1"/>
+          </a:fillRef>
+          <a:effectRef idx="0">
+            <a:schemeClr val="accent1"/>
+          </a:effectRef>
+          <a:fontRef idx="minor">
+            <a:schemeClr val="tx1"/>
+          </a:fontRef>
+        </p:style>
+      </p:cxnSp>
+      <p:sp>
+        <p:nvSpPr>
+          <p:cNvPr id="38" name="직사각형 37">
+            <a:extLst>
+              <a:ext uri="{FF2B5EF4-FFF2-40B4-BE49-F238E27FC236}">
+                <a16:creationId xmlns:a16="http://schemas.microsoft.com/office/drawing/2014/main" id="{79567242-E07F-3C46-7B51-A50CA916E566}"/>
+              </a:ext>
+            </a:extLst>
+          </p:cNvPr>
+          <p:cNvSpPr/>
+          <p:nvPr/>
+        </p:nvSpPr>
+        <p:spPr>
+          <a:xfrm>
+            <a:off x="4184650" y="323487"/>
+            <a:ext cx="707463" cy="241300"/>
+          </a:xfrm>
+          <a:prstGeom prst="rect">
+            <a:avLst/>
+          </a:prstGeom>
+          <a:noFill/>
+          <a:ln w="6350">
+            <a:solidFill>
+              <a:schemeClr val="tx1"/>
+            </a:solidFill>
+          </a:ln>
+        </p:spPr>
+        <p:style>
+          <a:lnRef idx="2">
+            <a:schemeClr val="accent1">
+              <a:shade val="15000"/>
+            </a:schemeClr>
+          </a:lnRef>
+          <a:fillRef idx="1">
+            <a:schemeClr val="accent1"/>
+          </a:fillRef>
+          <a:effectRef idx="0">
+            <a:schemeClr val="accent1"/>
+          </a:effectRef>
+          <a:fontRef idx="minor">
+            <a:schemeClr val="lt1"/>
+          </a:fontRef>
+        </p:style>
+        <p:txBody>
+          <a:bodyPr rtlCol="0" anchor="ctr"/>
+          <a:lstStyle/>
+          <a:p>
+            <a:pPr algn="ctr"/>
+            <a:r>
+              <a:rPr lang="en-US" altLang="ko-KR" sz="800" b="1" dirty="0">
+                <a:solidFill>
+                  <a:schemeClr val="tx1"/>
+                </a:solidFill>
+              </a:rPr>
+              <a:t>VOUT_SYS</a:t>
+            </a:r>
+            <a:endParaRPr lang="ko-KR" altLang="en-US" sz="800" b="1" dirty="0">
+              <a:solidFill>
+                <a:schemeClr val="tx1"/>
+              </a:solidFill>
+            </a:endParaRPr>
+          </a:p>
+        </p:txBody>
+      </p:sp>
+      <p:sp>
+        <p:nvSpPr>
+          <p:cNvPr id="39" name="직사각형 38">
+            <a:extLst>
+              <a:ext uri="{FF2B5EF4-FFF2-40B4-BE49-F238E27FC236}">
+                <a16:creationId xmlns:a16="http://schemas.microsoft.com/office/drawing/2014/main" id="{9D9B4B32-534F-3654-E0BE-712E5C8E529A}"/>
+              </a:ext>
+            </a:extLst>
+          </p:cNvPr>
+          <p:cNvSpPr/>
+          <p:nvPr/>
+        </p:nvSpPr>
+        <p:spPr>
+          <a:xfrm>
+            <a:off x="3189358" y="323487"/>
+            <a:ext cx="813755" cy="241300"/>
+          </a:xfrm>
+          <a:prstGeom prst="rect">
+            <a:avLst/>
+          </a:prstGeom>
+          <a:noFill/>
+          <a:ln w="6350">
+            <a:solidFill>
+              <a:schemeClr val="tx1"/>
+            </a:solidFill>
+          </a:ln>
+        </p:spPr>
+        <p:style>
+          <a:lnRef idx="2">
+            <a:schemeClr val="accent1">
+              <a:shade val="15000"/>
+            </a:schemeClr>
+          </a:lnRef>
+          <a:fillRef idx="1">
+            <a:schemeClr val="accent1"/>
+          </a:fillRef>
+          <a:effectRef idx="0">
+            <a:schemeClr val="accent1"/>
+          </a:effectRef>
+          <a:fontRef idx="minor">
+            <a:schemeClr val="lt1"/>
+          </a:fontRef>
+        </p:style>
+        <p:txBody>
+          <a:bodyPr rtlCol="0" anchor="ctr"/>
+          <a:lstStyle/>
+          <a:p>
+            <a:pPr algn="ctr"/>
+            <a:r>
+              <a:rPr lang="en-US" altLang="ko-KR" sz="800" b="1" dirty="0">
+                <a:solidFill>
+                  <a:schemeClr val="tx1"/>
+                </a:solidFill>
+              </a:rPr>
+              <a:t>EXT_VIN_DC</a:t>
+            </a:r>
+            <a:endParaRPr lang="ko-KR" altLang="en-US" sz="800" b="1" dirty="0">
+              <a:solidFill>
+                <a:schemeClr val="tx1"/>
+              </a:solidFill>
+            </a:endParaRPr>
+          </a:p>
+        </p:txBody>
+      </p:sp>
+      <p:sp>
+        <p:nvSpPr>
+          <p:cNvPr id="40" name="직사각형 39">
+            <a:extLst>
+              <a:ext uri="{FF2B5EF4-FFF2-40B4-BE49-F238E27FC236}">
+                <a16:creationId xmlns:a16="http://schemas.microsoft.com/office/drawing/2014/main" id="{815308E5-8820-9BBA-E992-EFCA14818D08}"/>
+              </a:ext>
+            </a:extLst>
+          </p:cNvPr>
+          <p:cNvSpPr/>
+          <p:nvPr/>
+        </p:nvSpPr>
+        <p:spPr>
+          <a:xfrm>
+            <a:off x="3180066" y="1027387"/>
+            <a:ext cx="834574" cy="241300"/>
+          </a:xfrm>
+          <a:prstGeom prst="rect">
+            <a:avLst/>
+          </a:prstGeom>
+          <a:noFill/>
+          <a:ln w="6350">
+            <a:solidFill>
+              <a:schemeClr val="tx1"/>
+            </a:solidFill>
+          </a:ln>
+        </p:spPr>
+        <p:style>
+          <a:lnRef idx="2">
+            <a:schemeClr val="accent1">
+              <a:shade val="15000"/>
+            </a:schemeClr>
+          </a:lnRef>
+          <a:fillRef idx="1">
+            <a:schemeClr val="accent1"/>
+          </a:fillRef>
+          <a:effectRef idx="0">
+            <a:schemeClr val="accent1"/>
+          </a:effectRef>
+          <a:fontRef idx="minor">
+            <a:schemeClr val="lt1"/>
+          </a:fontRef>
+        </p:style>
+        <p:txBody>
+          <a:bodyPr rtlCol="0" anchor="ctr"/>
+          <a:lstStyle/>
+          <a:p>
+            <a:pPr algn="ctr"/>
+            <a:r>
+              <a:rPr lang="en-US" altLang="ko-KR" sz="800" b="1" dirty="0">
+                <a:solidFill>
+                  <a:schemeClr val="tx1"/>
+                </a:solidFill>
+              </a:rPr>
+              <a:t>EXT_VIN_USB</a:t>
+            </a:r>
+            <a:endParaRPr lang="ko-KR" altLang="en-US" sz="800" b="1" dirty="0">
+              <a:solidFill>
+                <a:schemeClr val="tx1"/>
+              </a:solidFill>
+            </a:endParaRPr>
+          </a:p>
+        </p:txBody>
+      </p:sp>
+      <p:sp>
+        <p:nvSpPr>
+          <p:cNvPr id="41" name="직사각형 40">
+            <a:extLst>
+              <a:ext uri="{FF2B5EF4-FFF2-40B4-BE49-F238E27FC236}">
+                <a16:creationId xmlns:a16="http://schemas.microsoft.com/office/drawing/2014/main" id="{7B0C2D93-BDB7-294C-773F-1C7CE374AD68}"/>
+              </a:ext>
+            </a:extLst>
+          </p:cNvPr>
+          <p:cNvSpPr/>
+          <p:nvPr/>
+        </p:nvSpPr>
+        <p:spPr>
+          <a:xfrm>
+            <a:off x="3180066" y="2044325"/>
+            <a:ext cx="483884" cy="241300"/>
+          </a:xfrm>
+          <a:prstGeom prst="rect">
+            <a:avLst/>
+          </a:prstGeom>
+          <a:noFill/>
+          <a:ln w="6350">
+            <a:solidFill>
+              <a:schemeClr val="tx1"/>
+            </a:solidFill>
+          </a:ln>
+        </p:spPr>
+        <p:style>
+          <a:lnRef idx="2">
+            <a:schemeClr val="accent1">
+              <a:shade val="15000"/>
+            </a:schemeClr>
+          </a:lnRef>
+          <a:fillRef idx="1">
+            <a:schemeClr val="accent1"/>
+          </a:fillRef>
+          <a:effectRef idx="0">
+            <a:schemeClr val="accent1"/>
+          </a:effectRef>
+          <a:fontRef idx="minor">
+            <a:schemeClr val="lt1"/>
+          </a:fontRef>
+        </p:style>
+        <p:txBody>
+          <a:bodyPr rtlCol="0" anchor="ctr"/>
+          <a:lstStyle/>
+          <a:p>
+            <a:pPr algn="ctr"/>
+            <a:r>
+              <a:rPr lang="en-US" altLang="ko-KR" sz="800" b="1" dirty="0">
+                <a:solidFill>
+                  <a:schemeClr val="tx1"/>
+                </a:solidFill>
+              </a:rPr>
+              <a:t>PB_IN</a:t>
+            </a:r>
+            <a:endParaRPr lang="ko-KR" altLang="en-US" sz="800" b="1" dirty="0">
+              <a:solidFill>
+                <a:schemeClr val="tx1"/>
+              </a:solidFill>
+            </a:endParaRPr>
+          </a:p>
+        </p:txBody>
+      </p:sp>
+      <p:sp>
+        <p:nvSpPr>
+          <p:cNvPr id="42" name="직사각형 41">
+            <a:extLst>
+              <a:ext uri="{FF2B5EF4-FFF2-40B4-BE49-F238E27FC236}">
+                <a16:creationId xmlns:a16="http://schemas.microsoft.com/office/drawing/2014/main" id="{68537267-9CB4-41FC-070B-BF77B89412A3}"/>
+              </a:ext>
+            </a:extLst>
+          </p:cNvPr>
+          <p:cNvSpPr/>
+          <p:nvPr/>
+        </p:nvSpPr>
+        <p:spPr>
+          <a:xfrm>
+            <a:off x="3180066" y="2889104"/>
+            <a:ext cx="541034" cy="241300"/>
+          </a:xfrm>
+          <a:prstGeom prst="rect">
+            <a:avLst/>
+          </a:prstGeom>
+          <a:noFill/>
+          <a:ln w="6350">
+            <a:solidFill>
+              <a:schemeClr val="tx1"/>
+            </a:solidFill>
+          </a:ln>
+        </p:spPr>
+        <p:style>
+          <a:lnRef idx="2">
+            <a:schemeClr val="accent1">
+              <a:shade val="15000"/>
+            </a:schemeClr>
+          </a:lnRef>
+          <a:fillRef idx="1">
+            <a:schemeClr val="accent1"/>
+          </a:fillRef>
+          <a:effectRef idx="0">
+            <a:schemeClr val="accent1"/>
+          </a:effectRef>
+          <a:fontRef idx="minor">
+            <a:schemeClr val="lt1"/>
+          </a:fontRef>
+        </p:style>
+        <p:txBody>
+          <a:bodyPr rtlCol="0" anchor="ctr"/>
+          <a:lstStyle/>
+          <a:p>
+            <a:pPr algn="ctr"/>
+            <a:r>
+              <a:rPr lang="en-US" altLang="ko-KR" sz="800" b="1" dirty="0">
+                <a:solidFill>
+                  <a:schemeClr val="tx1"/>
+                </a:solidFill>
+              </a:rPr>
+              <a:t>nRESET</a:t>
+            </a:r>
+            <a:endParaRPr lang="ko-KR" altLang="en-US" sz="800" b="1" dirty="0">
+              <a:solidFill>
+                <a:schemeClr val="tx1"/>
+              </a:solidFill>
+            </a:endParaRPr>
+          </a:p>
+        </p:txBody>
+      </p:sp>
+      <p:sp>
+        <p:nvSpPr>
+          <p:cNvPr id="43" name="직사각형 42">
+            <a:extLst>
+              <a:ext uri="{FF2B5EF4-FFF2-40B4-BE49-F238E27FC236}">
+                <a16:creationId xmlns:a16="http://schemas.microsoft.com/office/drawing/2014/main" id="{E1C8AD6F-60AD-3A48-95F0-8BCD82DE6903}"/>
+              </a:ext>
+            </a:extLst>
+          </p:cNvPr>
+          <p:cNvSpPr/>
+          <p:nvPr/>
+        </p:nvSpPr>
+        <p:spPr>
+          <a:xfrm>
+            <a:off x="3188392" y="3699616"/>
+            <a:ext cx="596208" cy="241300"/>
+          </a:xfrm>
+          <a:prstGeom prst="rect">
+            <a:avLst/>
+          </a:prstGeom>
+          <a:noFill/>
+          <a:ln w="6350">
+            <a:solidFill>
+              <a:schemeClr val="tx1"/>
+            </a:solidFill>
+          </a:ln>
+        </p:spPr>
+        <p:style>
+          <a:lnRef idx="2">
+            <a:schemeClr val="accent1">
+              <a:shade val="15000"/>
+            </a:schemeClr>
+          </a:lnRef>
+          <a:fillRef idx="1">
+            <a:schemeClr val="accent1"/>
+          </a:fillRef>
+          <a:effectRef idx="0">
+            <a:schemeClr val="accent1"/>
+          </a:effectRef>
+          <a:fontRef idx="minor">
+            <a:schemeClr val="lt1"/>
+          </a:fontRef>
+        </p:style>
+        <p:txBody>
+          <a:bodyPr rtlCol="0" anchor="ctr"/>
+          <a:lstStyle/>
+          <a:p>
+            <a:pPr algn="ctr"/>
+            <a:r>
+              <a:rPr lang="en-US" altLang="ko-KR" sz="800" b="1" dirty="0">
+                <a:solidFill>
+                  <a:schemeClr val="tx1"/>
+                </a:solidFill>
+              </a:rPr>
+              <a:t>PWR_EN</a:t>
+            </a:r>
+            <a:endParaRPr lang="ko-KR" altLang="en-US" sz="800" b="1" dirty="0">
+              <a:solidFill>
+                <a:schemeClr val="tx1"/>
+              </a:solidFill>
+            </a:endParaRPr>
+          </a:p>
+        </p:txBody>
+      </p:sp>
+      <p:grpSp>
+        <p:nvGrpSpPr>
+          <p:cNvPr id="57" name="그룹 56">
+            <a:extLst>
+              <a:ext uri="{FF2B5EF4-FFF2-40B4-BE49-F238E27FC236}">
+                <a16:creationId xmlns:a16="http://schemas.microsoft.com/office/drawing/2014/main" id="{BD4ED5C9-129D-42B5-2461-EEEF86BDBDA4}"/>
+              </a:ext>
+            </a:extLst>
+          </p:cNvPr>
+          <p:cNvGrpSpPr/>
+          <p:nvPr/>
+        </p:nvGrpSpPr>
+        <p:grpSpPr>
+          <a:xfrm>
+            <a:off x="7218254" y="368378"/>
+            <a:ext cx="641680" cy="151518"/>
+            <a:chOff x="7112794" y="2769394"/>
+            <a:chExt cx="641680" cy="151518"/>
+          </a:xfrm>
+        </p:grpSpPr>
+        <p:sp>
+          <p:nvSpPr>
+            <p:cNvPr id="44" name="타원 43">
+              <a:extLst>
+                <a:ext uri="{FF2B5EF4-FFF2-40B4-BE49-F238E27FC236}">
+                  <a16:creationId xmlns:a16="http://schemas.microsoft.com/office/drawing/2014/main" id="{5B7564E5-E7C1-45DD-5584-BEE3B5019EAF}"/>
+                </a:ext>
+              </a:extLst>
+            </p:cNvPr>
+            <p:cNvSpPr/>
+            <p:nvPr/>
+          </p:nvSpPr>
+          <p:spPr>
+            <a:xfrm>
+              <a:off x="7270750" y="2846744"/>
+              <a:ext cx="72000" cy="72000"/>
+            </a:xfrm>
+            <a:prstGeom prst="ellipse">
+              <a:avLst/>
+            </a:prstGeom>
+            <a:noFill/>
+            <a:ln>
+              <a:solidFill>
+                <a:schemeClr val="tx1"/>
+              </a:solidFill>
+            </a:ln>
+          </p:spPr>
+          <p:style>
+            <a:lnRef idx="2">
+              <a:schemeClr val="accent1">
+                <a:shade val="15000"/>
+              </a:schemeClr>
+            </a:lnRef>
+            <a:fillRef idx="1">
+              <a:schemeClr val="accent1"/>
+            </a:fillRef>
+            <a:effectRef idx="0">
+              <a:schemeClr val="accent1"/>
+            </a:effectRef>
+            <a:fontRef idx="minor">
+              <a:schemeClr val="lt1"/>
+            </a:fontRef>
+          </p:style>
+          <p:txBody>
+            <a:bodyPr rtlCol="0" anchor="ctr"/>
+            <a:lstStyle/>
+            <a:p>
+              <a:pPr algn="ctr"/>
+              <a:endParaRPr lang="ko-KR" altLang="en-US"/>
+            </a:p>
+          </p:txBody>
+        </p:sp>
+        <p:cxnSp>
+          <p:nvCxnSpPr>
+            <p:cNvPr id="45" name="직선 연결선 44">
+              <a:extLst>
+                <a:ext uri="{FF2B5EF4-FFF2-40B4-BE49-F238E27FC236}">
+                  <a16:creationId xmlns:a16="http://schemas.microsoft.com/office/drawing/2014/main" id="{60EAE51F-876F-227E-335D-C9BEFB0A074B}"/>
+                </a:ext>
+              </a:extLst>
+            </p:cNvPr>
+            <p:cNvCxnSpPr>
+              <a:cxnSpLocks/>
+            </p:cNvCxnSpPr>
+            <p:nvPr/>
+          </p:nvCxnSpPr>
+          <p:spPr>
+            <a:xfrm flipH="1">
+              <a:off x="7112794" y="2877032"/>
+              <a:ext cx="155575" cy="0"/>
+            </a:xfrm>
+            <a:prstGeom prst="line">
+              <a:avLst/>
+            </a:prstGeom>
+            <a:ln w="15875">
+              <a:solidFill>
+                <a:schemeClr val="tx1"/>
+              </a:solidFill>
+            </a:ln>
+          </p:spPr>
+          <p:style>
+            <a:lnRef idx="2">
+              <a:schemeClr val="accent1"/>
+            </a:lnRef>
+            <a:fillRef idx="0">
+              <a:schemeClr val="accent1"/>
+            </a:fillRef>
+            <a:effectRef idx="1">
+              <a:schemeClr val="accent1"/>
+            </a:effectRef>
+            <a:fontRef idx="minor">
+              <a:schemeClr val="tx1"/>
+            </a:fontRef>
+          </p:style>
+        </p:cxnSp>
+        <p:cxnSp>
+          <p:nvCxnSpPr>
+            <p:cNvPr id="48" name="직선 연결선 47">
+              <a:extLst>
+                <a:ext uri="{FF2B5EF4-FFF2-40B4-BE49-F238E27FC236}">
+                  <a16:creationId xmlns:a16="http://schemas.microsoft.com/office/drawing/2014/main" id="{EF4ADE4E-C7CA-69CC-BE60-F11FB2B9F868}"/>
+                </a:ext>
+              </a:extLst>
+            </p:cNvPr>
+            <p:cNvCxnSpPr>
+              <a:cxnSpLocks/>
+              <a:endCxn id="44" idx="7"/>
+            </p:cNvCxnSpPr>
+            <p:nvPr/>
+          </p:nvCxnSpPr>
+          <p:spPr>
+            <a:xfrm flipH="1">
+              <a:off x="7332206" y="2769394"/>
+              <a:ext cx="194693" cy="87894"/>
+            </a:xfrm>
+            <a:prstGeom prst="line">
+              <a:avLst/>
+            </a:prstGeom>
+            <a:ln w="15875">
+              <a:solidFill>
+                <a:schemeClr val="tx1"/>
+              </a:solidFill>
+            </a:ln>
+          </p:spPr>
+          <p:style>
+            <a:lnRef idx="2">
+              <a:schemeClr val="accent1"/>
+            </a:lnRef>
+            <a:fillRef idx="0">
+              <a:schemeClr val="accent1"/>
+            </a:fillRef>
+            <a:effectRef idx="1">
+              <a:schemeClr val="accent1"/>
+            </a:effectRef>
+            <a:fontRef idx="minor">
+              <a:schemeClr val="tx1"/>
+            </a:fontRef>
+          </p:style>
+        </p:cxnSp>
+        <p:sp>
+          <p:nvSpPr>
+            <p:cNvPr id="49" name="타원 48">
+              <a:extLst>
+                <a:ext uri="{FF2B5EF4-FFF2-40B4-BE49-F238E27FC236}">
+                  <a16:creationId xmlns:a16="http://schemas.microsoft.com/office/drawing/2014/main" id="{EF17314A-D8EE-E6E3-8BBE-1F93930D6251}"/>
+                </a:ext>
+              </a:extLst>
+            </p:cNvPr>
+            <p:cNvSpPr/>
+            <p:nvPr/>
+          </p:nvSpPr>
+          <p:spPr>
+            <a:xfrm>
+              <a:off x="7526899" y="2848912"/>
+              <a:ext cx="72000" cy="72000"/>
+            </a:xfrm>
+            <a:prstGeom prst="ellipse">
+              <a:avLst/>
+            </a:prstGeom>
+            <a:noFill/>
+            <a:ln>
+              <a:solidFill>
+                <a:schemeClr val="tx1"/>
+              </a:solidFill>
+            </a:ln>
+          </p:spPr>
+          <p:style>
+            <a:lnRef idx="2">
+              <a:schemeClr val="accent1">
+                <a:shade val="15000"/>
+              </a:schemeClr>
+            </a:lnRef>
+            <a:fillRef idx="1">
+              <a:schemeClr val="accent1"/>
+            </a:fillRef>
+            <a:effectRef idx="0">
+              <a:schemeClr val="accent1"/>
+            </a:effectRef>
+            <a:fontRef idx="minor">
+              <a:schemeClr val="lt1"/>
+            </a:fontRef>
+          </p:style>
+          <p:txBody>
+            <a:bodyPr rtlCol="0" anchor="ctr"/>
+            <a:lstStyle/>
+            <a:p>
+              <a:pPr algn="ctr"/>
+              <a:endParaRPr lang="ko-KR" altLang="en-US"/>
+            </a:p>
+          </p:txBody>
+        </p:sp>
+        <p:cxnSp>
+          <p:nvCxnSpPr>
+            <p:cNvPr id="53" name="직선 연결선 52">
+              <a:extLst>
+                <a:ext uri="{FF2B5EF4-FFF2-40B4-BE49-F238E27FC236}">
+                  <a16:creationId xmlns:a16="http://schemas.microsoft.com/office/drawing/2014/main" id="{E859C069-C495-6A8A-E0A4-036124B4EC92}"/>
+                </a:ext>
+              </a:extLst>
+            </p:cNvPr>
+            <p:cNvCxnSpPr>
+              <a:cxnSpLocks/>
+            </p:cNvCxnSpPr>
+            <p:nvPr/>
+          </p:nvCxnSpPr>
+          <p:spPr>
+            <a:xfrm flipH="1">
+              <a:off x="7598899" y="2884912"/>
+              <a:ext cx="155575" cy="0"/>
+            </a:xfrm>
+            <a:prstGeom prst="line">
+              <a:avLst/>
+            </a:prstGeom>
+            <a:ln w="15875">
+              <a:solidFill>
+                <a:schemeClr val="tx1"/>
+              </a:solidFill>
+            </a:ln>
+          </p:spPr>
+          <p:style>
+            <a:lnRef idx="2">
+              <a:schemeClr val="accent1"/>
+            </a:lnRef>
+            <a:fillRef idx="0">
+              <a:schemeClr val="accent1"/>
+            </a:fillRef>
+            <a:effectRef idx="1">
+              <a:schemeClr val="accent1"/>
+            </a:effectRef>
+            <a:fontRef idx="minor">
+              <a:schemeClr val="tx1"/>
+            </a:fontRef>
+          </p:style>
+        </p:cxnSp>
+      </p:grpSp>
+      <p:grpSp>
+        <p:nvGrpSpPr>
+          <p:cNvPr id="58" name="그룹 57">
+            <a:extLst>
+              <a:ext uri="{FF2B5EF4-FFF2-40B4-BE49-F238E27FC236}">
+                <a16:creationId xmlns:a16="http://schemas.microsoft.com/office/drawing/2014/main" id="{C00CF8FF-A9A0-BBD8-6DF1-759638BB1FC7}"/>
+              </a:ext>
+            </a:extLst>
+          </p:cNvPr>
+          <p:cNvGrpSpPr/>
+          <p:nvPr/>
+        </p:nvGrpSpPr>
+        <p:grpSpPr>
+          <a:xfrm>
+            <a:off x="7214172" y="1027387"/>
+            <a:ext cx="641680" cy="151518"/>
+            <a:chOff x="7112794" y="2769394"/>
+            <a:chExt cx="641680" cy="151518"/>
+          </a:xfrm>
+        </p:grpSpPr>
+        <p:sp>
+          <p:nvSpPr>
+            <p:cNvPr id="59" name="타원 58">
+              <a:extLst>
+                <a:ext uri="{FF2B5EF4-FFF2-40B4-BE49-F238E27FC236}">
+                  <a16:creationId xmlns:a16="http://schemas.microsoft.com/office/drawing/2014/main" id="{083EBA3B-D7D6-FDDF-687F-8653AB4A8AA4}"/>
+                </a:ext>
+              </a:extLst>
+            </p:cNvPr>
+            <p:cNvSpPr/>
+            <p:nvPr/>
+          </p:nvSpPr>
+          <p:spPr>
+            <a:xfrm>
+              <a:off x="7270750" y="2846744"/>
+              <a:ext cx="72000" cy="72000"/>
+            </a:xfrm>
+            <a:prstGeom prst="ellipse">
+              <a:avLst/>
+            </a:prstGeom>
+            <a:noFill/>
+            <a:ln>
+              <a:solidFill>
+                <a:schemeClr val="tx1"/>
+              </a:solidFill>
+            </a:ln>
+          </p:spPr>
+          <p:style>
+            <a:lnRef idx="2">
+              <a:schemeClr val="accent1">
+                <a:shade val="15000"/>
+              </a:schemeClr>
+            </a:lnRef>
+            <a:fillRef idx="1">
+              <a:schemeClr val="accent1"/>
+            </a:fillRef>
+            <a:effectRef idx="0">
+              <a:schemeClr val="accent1"/>
+            </a:effectRef>
+            <a:fontRef idx="minor">
+              <a:schemeClr val="lt1"/>
+            </a:fontRef>
+          </p:style>
+          <p:txBody>
+            <a:bodyPr rtlCol="0" anchor="ctr"/>
+            <a:lstStyle/>
+            <a:p>
+              <a:pPr algn="ctr"/>
+              <a:endParaRPr lang="ko-KR" altLang="en-US"/>
+            </a:p>
+          </p:txBody>
+        </p:sp>
+        <p:cxnSp>
+          <p:nvCxnSpPr>
+            <p:cNvPr id="60" name="직선 연결선 59">
+              <a:extLst>
+                <a:ext uri="{FF2B5EF4-FFF2-40B4-BE49-F238E27FC236}">
+                  <a16:creationId xmlns:a16="http://schemas.microsoft.com/office/drawing/2014/main" id="{E259C77B-D2A0-8F90-4A7B-476E5A455CF0}"/>
+                </a:ext>
+              </a:extLst>
+            </p:cNvPr>
+            <p:cNvCxnSpPr>
+              <a:cxnSpLocks/>
+            </p:cNvCxnSpPr>
+            <p:nvPr/>
+          </p:nvCxnSpPr>
+          <p:spPr>
+            <a:xfrm flipH="1">
+              <a:off x="7112794" y="2877032"/>
+              <a:ext cx="155575" cy="0"/>
+            </a:xfrm>
+            <a:prstGeom prst="line">
+              <a:avLst/>
+            </a:prstGeom>
+            <a:ln w="15875">
+              <a:solidFill>
+                <a:schemeClr val="tx1"/>
+              </a:solidFill>
+            </a:ln>
+          </p:spPr>
+          <p:style>
+            <a:lnRef idx="2">
+              <a:schemeClr val="accent1"/>
+            </a:lnRef>
+            <a:fillRef idx="0">
+              <a:schemeClr val="accent1"/>
+            </a:fillRef>
+            <a:effectRef idx="1">
+              <a:schemeClr val="accent1"/>
+            </a:effectRef>
+            <a:fontRef idx="minor">
+              <a:schemeClr val="tx1"/>
+            </a:fontRef>
+          </p:style>
+        </p:cxnSp>
+        <p:cxnSp>
+          <p:nvCxnSpPr>
+            <p:cNvPr id="61" name="직선 연결선 60">
+              <a:extLst>
+                <a:ext uri="{FF2B5EF4-FFF2-40B4-BE49-F238E27FC236}">
+                  <a16:creationId xmlns:a16="http://schemas.microsoft.com/office/drawing/2014/main" id="{83F213DA-03CC-1BC1-AA9F-E430CADAA919}"/>
+                </a:ext>
+              </a:extLst>
+            </p:cNvPr>
+            <p:cNvCxnSpPr>
+              <a:cxnSpLocks/>
+              <a:endCxn id="59" idx="7"/>
+            </p:cNvCxnSpPr>
+            <p:nvPr/>
+          </p:nvCxnSpPr>
+          <p:spPr>
+            <a:xfrm flipH="1">
+              <a:off x="7332206" y="2769394"/>
+              <a:ext cx="194693" cy="87894"/>
+            </a:xfrm>
+            <a:prstGeom prst="line">
+              <a:avLst/>
+            </a:prstGeom>
+            <a:ln w="15875">
+              <a:solidFill>
+                <a:schemeClr val="tx1"/>
+              </a:solidFill>
+            </a:ln>
+          </p:spPr>
+          <p:style>
+            <a:lnRef idx="2">
+              <a:schemeClr val="accent1"/>
+            </a:lnRef>
+            <a:fillRef idx="0">
+              <a:schemeClr val="accent1"/>
+            </a:fillRef>
+            <a:effectRef idx="1">
+              <a:schemeClr val="accent1"/>
+            </a:effectRef>
+            <a:fontRef idx="minor">
+              <a:schemeClr val="tx1"/>
+            </a:fontRef>
+          </p:style>
+        </p:cxnSp>
+        <p:sp>
+          <p:nvSpPr>
+            <p:cNvPr id="62" name="타원 61">
+              <a:extLst>
+                <a:ext uri="{FF2B5EF4-FFF2-40B4-BE49-F238E27FC236}">
+                  <a16:creationId xmlns:a16="http://schemas.microsoft.com/office/drawing/2014/main" id="{FC6758C6-D903-0616-94C8-7EEA3AF9BDDC}"/>
+                </a:ext>
+              </a:extLst>
+            </p:cNvPr>
+            <p:cNvSpPr/>
+            <p:nvPr/>
+          </p:nvSpPr>
+          <p:spPr>
+            <a:xfrm>
+              <a:off x="7526899" y="2848912"/>
+              <a:ext cx="72000" cy="72000"/>
+            </a:xfrm>
+            <a:prstGeom prst="ellipse">
+              <a:avLst/>
+            </a:prstGeom>
+            <a:noFill/>
+            <a:ln>
+              <a:solidFill>
+                <a:schemeClr val="tx1"/>
+              </a:solidFill>
+            </a:ln>
+          </p:spPr>
+          <p:style>
+            <a:lnRef idx="2">
+              <a:schemeClr val="accent1">
+                <a:shade val="15000"/>
+              </a:schemeClr>
+            </a:lnRef>
+            <a:fillRef idx="1">
+              <a:schemeClr val="accent1"/>
+            </a:fillRef>
+            <a:effectRef idx="0">
+              <a:schemeClr val="accent1"/>
+            </a:effectRef>
+            <a:fontRef idx="minor">
+              <a:schemeClr val="lt1"/>
+            </a:fontRef>
+          </p:style>
+          <p:txBody>
+            <a:bodyPr rtlCol="0" anchor="ctr"/>
+            <a:lstStyle/>
+            <a:p>
+              <a:pPr algn="ctr"/>
+              <a:endParaRPr lang="ko-KR" altLang="en-US"/>
+            </a:p>
+          </p:txBody>
+        </p:sp>
+        <p:cxnSp>
+          <p:nvCxnSpPr>
+            <p:cNvPr id="63" name="직선 연결선 62">
+              <a:extLst>
+                <a:ext uri="{FF2B5EF4-FFF2-40B4-BE49-F238E27FC236}">
+                  <a16:creationId xmlns:a16="http://schemas.microsoft.com/office/drawing/2014/main" id="{BB95F30B-1BDF-9E9E-5007-A48C33F63E5A}"/>
+                </a:ext>
+              </a:extLst>
+            </p:cNvPr>
+            <p:cNvCxnSpPr>
+              <a:cxnSpLocks/>
+            </p:cNvCxnSpPr>
+            <p:nvPr/>
+          </p:nvCxnSpPr>
+          <p:spPr>
+            <a:xfrm flipH="1">
+              <a:off x="7598899" y="2884912"/>
+              <a:ext cx="155575" cy="0"/>
+            </a:xfrm>
+            <a:prstGeom prst="line">
+              <a:avLst/>
+            </a:prstGeom>
+            <a:ln w="15875">
+              <a:solidFill>
+                <a:schemeClr val="tx1"/>
+              </a:solidFill>
+            </a:ln>
+          </p:spPr>
+          <p:style>
+            <a:lnRef idx="2">
+              <a:schemeClr val="accent1"/>
+            </a:lnRef>
+            <a:fillRef idx="0">
+              <a:schemeClr val="accent1"/>
+            </a:fillRef>
+            <a:effectRef idx="1">
+              <a:schemeClr val="accent1"/>
+            </a:effectRef>
+            <a:fontRef idx="minor">
+              <a:schemeClr val="tx1"/>
+            </a:fontRef>
+          </p:style>
+        </p:cxnSp>
+      </p:grpSp>
+      <p:cxnSp>
+        <p:nvCxnSpPr>
+          <p:cNvPr id="64" name="직선 화살표 연결선 63">
+            <a:extLst>
+              <a:ext uri="{FF2B5EF4-FFF2-40B4-BE49-F238E27FC236}">
+                <a16:creationId xmlns:a16="http://schemas.microsoft.com/office/drawing/2014/main" id="{D3AB86FB-D4F7-D6C7-209E-D986F985717A}"/>
+              </a:ext>
+            </a:extLst>
+          </p:cNvPr>
+          <p:cNvCxnSpPr>
+            <a:cxnSpLocks/>
+          </p:cNvCxnSpPr>
+          <p:nvPr/>
+        </p:nvCxnSpPr>
+        <p:spPr>
+          <a:xfrm>
+            <a:off x="7778064" y="483977"/>
+            <a:ext cx="1113524" cy="0"/>
+          </a:xfrm>
+          <a:prstGeom prst="straightConnector1">
+            <a:avLst/>
+          </a:prstGeom>
+          <a:ln w="15875">
+            <a:solidFill>
+              <a:schemeClr val="tx1"/>
+            </a:solidFill>
+            <a:tailEnd type="triangle"/>
+          </a:ln>
+        </p:spPr>
+        <p:style>
+          <a:lnRef idx="1">
+            <a:schemeClr val="accent1"/>
+          </a:lnRef>
+          <a:fillRef idx="0">
+            <a:schemeClr val="accent1"/>
+          </a:fillRef>
+          <a:effectRef idx="0">
+            <a:schemeClr val="accent1"/>
+          </a:effectRef>
+          <a:fontRef idx="minor">
+            <a:schemeClr val="tx1"/>
+          </a:fontRef>
+        </p:style>
+      </p:cxnSp>
+      <p:cxnSp>
+        <p:nvCxnSpPr>
+          <p:cNvPr id="66" name="직선 연결선 65">
+            <a:extLst>
+              <a:ext uri="{FF2B5EF4-FFF2-40B4-BE49-F238E27FC236}">
+                <a16:creationId xmlns:a16="http://schemas.microsoft.com/office/drawing/2014/main" id="{2CE8E46B-8D7E-4059-F60D-A03A66065DAF}"/>
+              </a:ext>
+            </a:extLst>
+          </p:cNvPr>
+          <p:cNvCxnSpPr>
+            <a:cxnSpLocks/>
+          </p:cNvCxnSpPr>
+          <p:nvPr/>
+        </p:nvCxnSpPr>
+        <p:spPr>
+          <a:xfrm flipH="1">
+            <a:off x="7750626" y="1141342"/>
+            <a:ext cx="493262" cy="0"/>
+          </a:xfrm>
+          <a:prstGeom prst="line">
+            <a:avLst/>
+          </a:prstGeom>
+          <a:ln w="15875">
+            <a:solidFill>
+              <a:schemeClr val="tx1"/>
+            </a:solidFill>
+          </a:ln>
+        </p:spPr>
+        <p:style>
+          <a:lnRef idx="2">
+            <a:schemeClr val="accent1"/>
+          </a:lnRef>
+          <a:fillRef idx="0">
+            <a:schemeClr val="accent1"/>
+          </a:fillRef>
+          <a:effectRef idx="1">
+            <a:schemeClr val="accent1"/>
+          </a:effectRef>
+          <a:fontRef idx="minor">
+            <a:schemeClr val="tx1"/>
+          </a:fontRef>
+        </p:style>
+      </p:cxnSp>
+      <p:cxnSp>
+        <p:nvCxnSpPr>
+          <p:cNvPr id="69" name="직선 연결선 68">
+            <a:extLst>
+              <a:ext uri="{FF2B5EF4-FFF2-40B4-BE49-F238E27FC236}">
+                <a16:creationId xmlns:a16="http://schemas.microsoft.com/office/drawing/2014/main" id="{405EDF43-4BD2-81ED-7DED-75E07B1DC3F1}"/>
+              </a:ext>
+            </a:extLst>
+          </p:cNvPr>
+          <p:cNvCxnSpPr>
+            <a:cxnSpLocks/>
+          </p:cNvCxnSpPr>
+          <p:nvPr/>
+        </p:nvCxnSpPr>
+        <p:spPr>
+          <a:xfrm>
+            <a:off x="8239126" y="488658"/>
+            <a:ext cx="0" cy="659009"/>
+          </a:xfrm>
+          <a:prstGeom prst="line">
+            <a:avLst/>
+          </a:prstGeom>
+          <a:ln w="15875">
+            <a:solidFill>
+              <a:schemeClr val="tx1"/>
+            </a:solidFill>
+          </a:ln>
+        </p:spPr>
+        <p:style>
+          <a:lnRef idx="2">
+            <a:schemeClr val="accent1"/>
+          </a:lnRef>
+          <a:fillRef idx="0">
+            <a:schemeClr val="accent1"/>
+          </a:fillRef>
+          <a:effectRef idx="1">
+            <a:schemeClr val="accent1"/>
+          </a:effectRef>
+          <a:fontRef idx="minor">
+            <a:schemeClr val="tx1"/>
+          </a:fontRef>
+        </p:style>
+      </p:cxnSp>
+      <p:cxnSp>
+        <p:nvCxnSpPr>
+          <p:cNvPr id="72" name="직선 화살표 연결선 71">
+            <a:extLst>
+              <a:ext uri="{FF2B5EF4-FFF2-40B4-BE49-F238E27FC236}">
+                <a16:creationId xmlns:a16="http://schemas.microsoft.com/office/drawing/2014/main" id="{3A3FA3EA-CA20-ED3F-A150-0377EE4C8A3C}"/>
+              </a:ext>
+            </a:extLst>
+          </p:cNvPr>
+          <p:cNvCxnSpPr>
+            <a:cxnSpLocks/>
+          </p:cNvCxnSpPr>
+          <p:nvPr/>
+        </p:nvCxnSpPr>
+        <p:spPr>
+          <a:xfrm>
+            <a:off x="4968239" y="3009754"/>
+            <a:ext cx="3923349" cy="0"/>
+          </a:xfrm>
+          <a:prstGeom prst="straightConnector1">
+            <a:avLst/>
+          </a:prstGeom>
+          <a:ln w="15875">
+            <a:solidFill>
+              <a:schemeClr val="tx1"/>
+            </a:solidFill>
+            <a:tailEnd type="triangle"/>
+          </a:ln>
+        </p:spPr>
+        <p:style>
+          <a:lnRef idx="1">
+            <a:schemeClr val="accent1"/>
+          </a:lnRef>
+          <a:fillRef idx="0">
+            <a:schemeClr val="accent1"/>
+          </a:fillRef>
+          <a:effectRef idx="0">
+            <a:schemeClr val="accent1"/>
+          </a:effectRef>
+          <a:fontRef idx="minor">
+            <a:schemeClr val="tx1"/>
+          </a:fontRef>
+        </p:style>
+      </p:cxnSp>
+      <p:sp>
+        <p:nvSpPr>
+          <p:cNvPr id="75" name="직사각형 74">
+            <a:extLst>
+              <a:ext uri="{FF2B5EF4-FFF2-40B4-BE49-F238E27FC236}">
+                <a16:creationId xmlns:a16="http://schemas.microsoft.com/office/drawing/2014/main" id="{5761E5BD-A118-E7E3-C4BA-C1B8631DCEB3}"/>
+              </a:ext>
+            </a:extLst>
+          </p:cNvPr>
+          <p:cNvSpPr/>
+          <p:nvPr/>
+        </p:nvSpPr>
+        <p:spPr>
+          <a:xfrm>
+            <a:off x="4502605" y="1585307"/>
+            <a:ext cx="389508" cy="241300"/>
+          </a:xfrm>
+          <a:prstGeom prst="rect">
+            <a:avLst/>
+          </a:prstGeom>
+          <a:noFill/>
+          <a:ln w="6350">
+            <a:solidFill>
+              <a:schemeClr val="tx1"/>
+            </a:solidFill>
+          </a:ln>
+        </p:spPr>
+        <p:style>
+          <a:lnRef idx="2">
+            <a:schemeClr val="accent1">
+              <a:shade val="15000"/>
+            </a:schemeClr>
+          </a:lnRef>
+          <a:fillRef idx="1">
+            <a:schemeClr val="accent1"/>
+          </a:fillRef>
+          <a:effectRef idx="0">
+            <a:schemeClr val="accent1"/>
+          </a:effectRef>
+          <a:fontRef idx="minor">
+            <a:schemeClr val="lt1"/>
+          </a:fontRef>
+        </p:style>
+        <p:txBody>
+          <a:bodyPr rtlCol="0" anchor="ctr"/>
+          <a:lstStyle/>
+          <a:p>
+            <a:pPr algn="ctr"/>
+            <a:r>
+              <a:rPr lang="en-US" altLang="ko-KR" sz="800" b="1" dirty="0">
+                <a:solidFill>
+                  <a:schemeClr val="tx1"/>
+                </a:solidFill>
+              </a:rPr>
+              <a:t>SCL</a:t>
+            </a:r>
+            <a:endParaRPr lang="ko-KR" altLang="en-US" sz="800" b="1" dirty="0">
+              <a:solidFill>
+                <a:schemeClr val="tx1"/>
+              </a:solidFill>
+            </a:endParaRPr>
+          </a:p>
+        </p:txBody>
+      </p:sp>
+      <p:sp>
+        <p:nvSpPr>
+          <p:cNvPr id="76" name="직사각형 75">
+            <a:extLst>
+              <a:ext uri="{FF2B5EF4-FFF2-40B4-BE49-F238E27FC236}">
+                <a16:creationId xmlns:a16="http://schemas.microsoft.com/office/drawing/2014/main" id="{6005BDAD-DDB2-3F3C-4DED-AB5633716ECE}"/>
+              </a:ext>
+            </a:extLst>
+          </p:cNvPr>
+          <p:cNvSpPr/>
+          <p:nvPr/>
+        </p:nvSpPr>
+        <p:spPr>
+          <a:xfrm>
+            <a:off x="4502605" y="1892395"/>
+            <a:ext cx="389508" cy="241300"/>
+          </a:xfrm>
+          <a:prstGeom prst="rect">
+            <a:avLst/>
+          </a:prstGeom>
+          <a:noFill/>
+          <a:ln w="6350">
+            <a:solidFill>
+              <a:schemeClr val="tx1"/>
+            </a:solidFill>
+          </a:ln>
+        </p:spPr>
+        <p:style>
+          <a:lnRef idx="2">
+            <a:schemeClr val="accent1">
+              <a:shade val="15000"/>
+            </a:schemeClr>
+          </a:lnRef>
+          <a:fillRef idx="1">
+            <a:schemeClr val="accent1"/>
+          </a:fillRef>
+          <a:effectRef idx="0">
+            <a:schemeClr val="accent1"/>
+          </a:effectRef>
+          <a:fontRef idx="minor">
+            <a:schemeClr val="lt1"/>
+          </a:fontRef>
+        </p:style>
+        <p:txBody>
+          <a:bodyPr rtlCol="0" anchor="ctr"/>
+          <a:lstStyle/>
+          <a:p>
+            <a:pPr algn="ctr"/>
+            <a:r>
+              <a:rPr lang="en-US" altLang="ko-KR" sz="800" b="1" dirty="0">
+                <a:solidFill>
+                  <a:schemeClr val="tx1"/>
+                </a:solidFill>
+              </a:rPr>
+              <a:t>SDA</a:t>
+            </a:r>
+            <a:endParaRPr lang="ko-KR" altLang="en-US" sz="800" b="1" dirty="0">
+              <a:solidFill>
+                <a:schemeClr val="tx1"/>
+              </a:solidFill>
+            </a:endParaRPr>
+          </a:p>
+        </p:txBody>
+      </p:sp>
+      <p:sp>
+        <p:nvSpPr>
+          <p:cNvPr id="77" name="직사각형 76">
+            <a:extLst>
+              <a:ext uri="{FF2B5EF4-FFF2-40B4-BE49-F238E27FC236}">
+                <a16:creationId xmlns:a16="http://schemas.microsoft.com/office/drawing/2014/main" id="{FEADCD77-C63E-C324-F7AA-9F60681BC380}"/>
+              </a:ext>
+            </a:extLst>
+          </p:cNvPr>
+          <p:cNvSpPr/>
+          <p:nvPr/>
+        </p:nvSpPr>
+        <p:spPr>
+          <a:xfrm>
+            <a:off x="4321247" y="2885010"/>
+            <a:ext cx="570866" cy="241300"/>
+          </a:xfrm>
+          <a:prstGeom prst="rect">
+            <a:avLst/>
+          </a:prstGeom>
+          <a:noFill/>
+          <a:ln w="6350">
+            <a:solidFill>
+              <a:schemeClr val="tx1"/>
+            </a:solidFill>
+          </a:ln>
+        </p:spPr>
+        <p:style>
+          <a:lnRef idx="2">
+            <a:schemeClr val="accent1">
+              <a:shade val="15000"/>
+            </a:schemeClr>
+          </a:lnRef>
+          <a:fillRef idx="1">
+            <a:schemeClr val="accent1"/>
+          </a:fillRef>
+          <a:effectRef idx="0">
+            <a:schemeClr val="accent1"/>
+          </a:effectRef>
+          <a:fontRef idx="minor">
+            <a:schemeClr val="lt1"/>
+          </a:fontRef>
+        </p:style>
+        <p:txBody>
+          <a:bodyPr rtlCol="0" anchor="ctr"/>
+          <a:lstStyle/>
+          <a:p>
+            <a:pPr algn="ctr"/>
+            <a:r>
+              <a:rPr lang="en-US" altLang="ko-KR" sz="800" b="1" dirty="0">
+                <a:solidFill>
+                  <a:schemeClr val="tx1"/>
+                </a:solidFill>
+              </a:rPr>
+              <a:t>PGOOD</a:t>
+            </a:r>
+            <a:endParaRPr lang="ko-KR" altLang="en-US" sz="800" b="1" dirty="0">
+              <a:solidFill>
+                <a:schemeClr val="tx1"/>
+              </a:solidFill>
+            </a:endParaRPr>
+          </a:p>
+        </p:txBody>
+      </p:sp>
+      <p:sp>
+        <p:nvSpPr>
+          <p:cNvPr id="78" name="직사각형 77">
+            <a:extLst>
+              <a:ext uri="{FF2B5EF4-FFF2-40B4-BE49-F238E27FC236}">
+                <a16:creationId xmlns:a16="http://schemas.microsoft.com/office/drawing/2014/main" id="{40CE97D8-CB70-593C-093B-9D943B053553}"/>
+              </a:ext>
+            </a:extLst>
+          </p:cNvPr>
+          <p:cNvSpPr/>
+          <p:nvPr/>
+        </p:nvSpPr>
+        <p:spPr>
+          <a:xfrm>
+            <a:off x="3905478" y="3192098"/>
+            <a:ext cx="982978" cy="241300"/>
+          </a:xfrm>
+          <a:prstGeom prst="rect">
+            <a:avLst/>
+          </a:prstGeom>
+          <a:noFill/>
+          <a:ln w="6350">
+            <a:solidFill>
+              <a:schemeClr val="tx1"/>
+            </a:solidFill>
+          </a:ln>
+        </p:spPr>
+        <p:style>
+          <a:lnRef idx="2">
+            <a:schemeClr val="accent1">
+              <a:shade val="15000"/>
+            </a:schemeClr>
+          </a:lnRef>
+          <a:fillRef idx="1">
+            <a:schemeClr val="accent1"/>
+          </a:fillRef>
+          <a:effectRef idx="0">
+            <a:schemeClr val="accent1"/>
+          </a:effectRef>
+          <a:fontRef idx="minor">
+            <a:schemeClr val="lt1"/>
+          </a:fontRef>
+        </p:style>
+        <p:txBody>
+          <a:bodyPr rtlCol="0" anchor="ctr"/>
+          <a:lstStyle/>
+          <a:p>
+            <a:pPr algn="ctr"/>
+            <a:r>
+              <a:rPr lang="en-US" altLang="ko-KR" sz="800" b="1" dirty="0">
+                <a:solidFill>
+                  <a:schemeClr val="tx1"/>
+                </a:solidFill>
+              </a:rPr>
+              <a:t>PGOOD_LDO1/2</a:t>
+            </a:r>
+            <a:endParaRPr lang="ko-KR" altLang="en-US" sz="800" b="1" dirty="0">
+              <a:solidFill>
+                <a:schemeClr val="tx1"/>
+              </a:solidFill>
+            </a:endParaRPr>
+          </a:p>
+        </p:txBody>
+      </p:sp>
+      <p:sp>
+        <p:nvSpPr>
+          <p:cNvPr id="79" name="직사각형 78">
+            <a:extLst>
+              <a:ext uri="{FF2B5EF4-FFF2-40B4-BE49-F238E27FC236}">
+                <a16:creationId xmlns:a16="http://schemas.microsoft.com/office/drawing/2014/main" id="{08B4A45F-746C-3842-3AAB-496F743A9FAE}"/>
+              </a:ext>
+            </a:extLst>
+          </p:cNvPr>
+          <p:cNvSpPr/>
+          <p:nvPr/>
+        </p:nvSpPr>
+        <p:spPr>
+          <a:xfrm>
+            <a:off x="4393156" y="3499186"/>
+            <a:ext cx="495300" cy="241300"/>
+          </a:xfrm>
+          <a:prstGeom prst="rect">
+            <a:avLst/>
+          </a:prstGeom>
+          <a:noFill/>
+          <a:ln w="6350">
+            <a:solidFill>
+              <a:schemeClr val="tx1"/>
+            </a:solidFill>
+          </a:ln>
+        </p:spPr>
+        <p:style>
+          <a:lnRef idx="2">
+            <a:schemeClr val="accent1">
+              <a:shade val="15000"/>
+            </a:schemeClr>
+          </a:lnRef>
+          <a:fillRef idx="1">
+            <a:schemeClr val="accent1"/>
+          </a:fillRef>
+          <a:effectRef idx="0">
+            <a:schemeClr val="accent1"/>
+          </a:effectRef>
+          <a:fontRef idx="minor">
+            <a:schemeClr val="lt1"/>
+          </a:fontRef>
+        </p:style>
+        <p:txBody>
+          <a:bodyPr rtlCol="0" anchor="ctr"/>
+          <a:lstStyle/>
+          <a:p>
+            <a:pPr algn="ctr"/>
+            <a:r>
+              <a:rPr lang="en-US" altLang="ko-KR" sz="800" b="1" dirty="0">
+                <a:solidFill>
+                  <a:schemeClr val="tx1"/>
+                </a:solidFill>
+              </a:rPr>
+              <a:t>nINT</a:t>
+            </a:r>
+            <a:endParaRPr lang="ko-KR" altLang="en-US" sz="800" b="1" dirty="0">
+              <a:solidFill>
+                <a:schemeClr val="tx1"/>
+              </a:solidFill>
+            </a:endParaRPr>
+          </a:p>
+        </p:txBody>
+      </p:sp>
+      <p:sp>
+        <p:nvSpPr>
+          <p:cNvPr id="80" name="직사각형 79">
+            <a:extLst>
+              <a:ext uri="{FF2B5EF4-FFF2-40B4-BE49-F238E27FC236}">
+                <a16:creationId xmlns:a16="http://schemas.microsoft.com/office/drawing/2014/main" id="{7435BCA5-E98E-0FC4-834E-489CE14DFD16}"/>
+              </a:ext>
+            </a:extLst>
+          </p:cNvPr>
+          <p:cNvSpPr/>
+          <p:nvPr/>
+        </p:nvSpPr>
+        <p:spPr>
+          <a:xfrm>
+            <a:off x="4173007" y="3806274"/>
+            <a:ext cx="715449" cy="241300"/>
+          </a:xfrm>
+          <a:prstGeom prst="rect">
+            <a:avLst/>
+          </a:prstGeom>
+          <a:noFill/>
+          <a:ln w="6350">
+            <a:solidFill>
+              <a:schemeClr val="tx1"/>
+            </a:solidFill>
+          </a:ln>
+        </p:spPr>
+        <p:style>
+          <a:lnRef idx="2">
+            <a:schemeClr val="accent1">
+              <a:shade val="15000"/>
+            </a:schemeClr>
+          </a:lnRef>
+          <a:fillRef idx="1">
+            <a:schemeClr val="accent1"/>
+          </a:fillRef>
+          <a:effectRef idx="0">
+            <a:schemeClr val="accent1"/>
+          </a:effectRef>
+          <a:fontRef idx="minor">
+            <a:schemeClr val="lt1"/>
+          </a:fontRef>
+        </p:style>
+        <p:txBody>
+          <a:bodyPr rtlCol="0" anchor="ctr"/>
+          <a:lstStyle/>
+          <a:p>
+            <a:pPr algn="ctr"/>
+            <a:r>
+              <a:rPr lang="en-US" altLang="ko-KR" sz="800" b="1" dirty="0">
+                <a:solidFill>
+                  <a:schemeClr val="tx1"/>
+                </a:solidFill>
+              </a:rPr>
+              <a:t>nWAKEUP</a:t>
+            </a:r>
+            <a:endParaRPr lang="ko-KR" altLang="en-US" sz="800" b="1" dirty="0">
+              <a:solidFill>
+                <a:schemeClr val="tx1"/>
+              </a:solidFill>
+            </a:endParaRPr>
+          </a:p>
+        </p:txBody>
+      </p:sp>
+      <p:cxnSp>
+        <p:nvCxnSpPr>
+          <p:cNvPr id="81" name="직선 화살표 연결선 80">
+            <a:extLst>
+              <a:ext uri="{FF2B5EF4-FFF2-40B4-BE49-F238E27FC236}">
+                <a16:creationId xmlns:a16="http://schemas.microsoft.com/office/drawing/2014/main" id="{A0B46864-B9C6-B607-6F55-39CF01A2300C}"/>
+              </a:ext>
+            </a:extLst>
+          </p:cNvPr>
+          <p:cNvCxnSpPr>
+            <a:cxnSpLocks/>
+          </p:cNvCxnSpPr>
+          <p:nvPr/>
+        </p:nvCxnSpPr>
+        <p:spPr>
+          <a:xfrm flipH="1">
+            <a:off x="4968239" y="1690702"/>
+            <a:ext cx="3923349" cy="0"/>
+          </a:xfrm>
+          <a:prstGeom prst="straightConnector1">
+            <a:avLst/>
+          </a:prstGeom>
+          <a:ln w="15875">
+            <a:solidFill>
+              <a:schemeClr val="tx1"/>
+            </a:solidFill>
+            <a:tailEnd type="triangle"/>
+          </a:ln>
+        </p:spPr>
+        <p:style>
+          <a:lnRef idx="1">
+            <a:schemeClr val="accent1"/>
+          </a:lnRef>
+          <a:fillRef idx="0">
+            <a:schemeClr val="accent1"/>
+          </a:fillRef>
+          <a:effectRef idx="0">
+            <a:schemeClr val="accent1"/>
+          </a:effectRef>
+          <a:fontRef idx="minor">
+            <a:schemeClr val="tx1"/>
+          </a:fontRef>
+        </p:style>
+      </p:cxnSp>
+      <p:cxnSp>
+        <p:nvCxnSpPr>
+          <p:cNvPr id="84" name="직선 화살표 연결선 83">
+            <a:extLst>
+              <a:ext uri="{FF2B5EF4-FFF2-40B4-BE49-F238E27FC236}">
+                <a16:creationId xmlns:a16="http://schemas.microsoft.com/office/drawing/2014/main" id="{BB05E489-1E9D-C1A7-E9A2-233558F27919}"/>
+              </a:ext>
+            </a:extLst>
+          </p:cNvPr>
+          <p:cNvCxnSpPr>
+            <a:cxnSpLocks/>
+          </p:cNvCxnSpPr>
+          <p:nvPr/>
+        </p:nvCxnSpPr>
+        <p:spPr>
+          <a:xfrm>
+            <a:off x="4968239" y="2008577"/>
+            <a:ext cx="3923349" cy="0"/>
+          </a:xfrm>
+          <a:prstGeom prst="straightConnector1">
+            <a:avLst/>
+          </a:prstGeom>
+          <a:ln w="15875">
+            <a:solidFill>
+              <a:schemeClr val="tx1"/>
+            </a:solidFill>
+            <a:headEnd type="triangle"/>
+            <a:tailEnd type="triangle"/>
+          </a:ln>
+        </p:spPr>
+        <p:style>
+          <a:lnRef idx="1">
+            <a:schemeClr val="accent1"/>
+          </a:lnRef>
+          <a:fillRef idx="0">
+            <a:schemeClr val="accent1"/>
+          </a:fillRef>
+          <a:effectRef idx="0">
+            <a:schemeClr val="accent1"/>
+          </a:effectRef>
+          <a:fontRef idx="minor">
+            <a:schemeClr val="tx1"/>
+          </a:fontRef>
+        </p:style>
+      </p:cxnSp>
+      <p:cxnSp>
+        <p:nvCxnSpPr>
+          <p:cNvPr id="87" name="직선 화살표 연결선 86">
+            <a:extLst>
+              <a:ext uri="{FF2B5EF4-FFF2-40B4-BE49-F238E27FC236}">
+                <a16:creationId xmlns:a16="http://schemas.microsoft.com/office/drawing/2014/main" id="{327B36F5-E896-9390-D94C-BE6B5700E13E}"/>
+              </a:ext>
+            </a:extLst>
+          </p:cNvPr>
+          <p:cNvCxnSpPr>
+            <a:cxnSpLocks/>
+          </p:cNvCxnSpPr>
+          <p:nvPr/>
+        </p:nvCxnSpPr>
+        <p:spPr>
+          <a:xfrm>
+            <a:off x="4968239" y="3298794"/>
+            <a:ext cx="3923349" cy="0"/>
+          </a:xfrm>
+          <a:prstGeom prst="straightConnector1">
+            <a:avLst/>
+          </a:prstGeom>
+          <a:ln w="15875">
+            <a:solidFill>
+              <a:schemeClr val="tx1"/>
+            </a:solidFill>
+            <a:tailEnd type="triangle"/>
+          </a:ln>
+        </p:spPr>
+        <p:style>
+          <a:lnRef idx="1">
+            <a:schemeClr val="accent1"/>
+          </a:lnRef>
+          <a:fillRef idx="0">
+            <a:schemeClr val="accent1"/>
+          </a:fillRef>
+          <a:effectRef idx="0">
+            <a:schemeClr val="accent1"/>
+          </a:effectRef>
+          <a:fontRef idx="minor">
+            <a:schemeClr val="tx1"/>
+          </a:fontRef>
+        </p:style>
+      </p:cxnSp>
+      <p:cxnSp>
+        <p:nvCxnSpPr>
+          <p:cNvPr id="88" name="직선 화살표 연결선 87">
+            <a:extLst>
+              <a:ext uri="{FF2B5EF4-FFF2-40B4-BE49-F238E27FC236}">
+                <a16:creationId xmlns:a16="http://schemas.microsoft.com/office/drawing/2014/main" id="{9E435475-9FEE-BC22-815C-F2156AFFCDD2}"/>
+              </a:ext>
+            </a:extLst>
+          </p:cNvPr>
+          <p:cNvCxnSpPr>
+            <a:cxnSpLocks/>
+          </p:cNvCxnSpPr>
+          <p:nvPr/>
+        </p:nvCxnSpPr>
+        <p:spPr>
+          <a:xfrm>
+            <a:off x="4968239" y="3610425"/>
+            <a:ext cx="3923349" cy="0"/>
+          </a:xfrm>
+          <a:prstGeom prst="straightConnector1">
+            <a:avLst/>
+          </a:prstGeom>
+          <a:ln w="15875">
+            <a:solidFill>
+              <a:schemeClr val="tx1"/>
+            </a:solidFill>
+            <a:tailEnd type="triangle"/>
+          </a:ln>
+        </p:spPr>
+        <p:style>
+          <a:lnRef idx="1">
+            <a:schemeClr val="accent1"/>
+          </a:lnRef>
+          <a:fillRef idx="0">
+            <a:schemeClr val="accent1"/>
+          </a:fillRef>
+          <a:effectRef idx="0">
+            <a:schemeClr val="accent1"/>
+          </a:effectRef>
+          <a:fontRef idx="minor">
+            <a:schemeClr val="tx1"/>
+          </a:fontRef>
+        </p:style>
+      </p:cxnSp>
+      <p:cxnSp>
+        <p:nvCxnSpPr>
+          <p:cNvPr id="89" name="직선 화살표 연결선 88">
+            <a:extLst>
+              <a:ext uri="{FF2B5EF4-FFF2-40B4-BE49-F238E27FC236}">
+                <a16:creationId xmlns:a16="http://schemas.microsoft.com/office/drawing/2014/main" id="{C0707708-2F91-FF00-8284-A0FEAF9724CB}"/>
+              </a:ext>
+            </a:extLst>
+          </p:cNvPr>
+          <p:cNvCxnSpPr>
+            <a:cxnSpLocks/>
+          </p:cNvCxnSpPr>
+          <p:nvPr/>
+        </p:nvCxnSpPr>
+        <p:spPr>
+          <a:xfrm>
+            <a:off x="4968239" y="3921866"/>
+            <a:ext cx="3923349" cy="0"/>
+          </a:xfrm>
+          <a:prstGeom prst="straightConnector1">
+            <a:avLst/>
+          </a:prstGeom>
+          <a:ln w="15875">
+            <a:solidFill>
+              <a:schemeClr val="tx1"/>
+            </a:solidFill>
+            <a:tailEnd type="triangle"/>
+          </a:ln>
+        </p:spPr>
+        <p:style>
+          <a:lnRef idx="1">
+            <a:schemeClr val="accent1"/>
+          </a:lnRef>
+          <a:fillRef idx="0">
+            <a:schemeClr val="accent1"/>
+          </a:fillRef>
+          <a:effectRef idx="0">
+            <a:schemeClr val="accent1"/>
+          </a:effectRef>
+          <a:fontRef idx="minor">
+            <a:schemeClr val="tx1"/>
+          </a:fontRef>
+        </p:style>
+      </p:cxnSp>
+      <p:cxnSp>
+        <p:nvCxnSpPr>
+          <p:cNvPr id="90" name="직선 연결선 89">
+            <a:extLst>
+              <a:ext uri="{FF2B5EF4-FFF2-40B4-BE49-F238E27FC236}">
+                <a16:creationId xmlns:a16="http://schemas.microsoft.com/office/drawing/2014/main" id="{ADED6D37-C6EC-93E7-A0A5-7C04566CDB76}"/>
+              </a:ext>
+            </a:extLst>
+          </p:cNvPr>
+          <p:cNvCxnSpPr>
+            <a:cxnSpLocks/>
+          </p:cNvCxnSpPr>
+          <p:nvPr/>
+        </p:nvCxnSpPr>
+        <p:spPr>
+          <a:xfrm flipH="1">
+            <a:off x="2696135" y="4709298"/>
+            <a:ext cx="6195453" cy="0"/>
+          </a:xfrm>
+          <a:prstGeom prst="line">
+            <a:avLst/>
+          </a:prstGeom>
+          <a:ln w="15875">
+            <a:solidFill>
+              <a:schemeClr val="tx1"/>
+            </a:solidFill>
+          </a:ln>
+        </p:spPr>
+        <p:style>
+          <a:lnRef idx="2">
+            <a:schemeClr val="accent1"/>
+          </a:lnRef>
+          <a:fillRef idx="0">
+            <a:schemeClr val="accent1"/>
+          </a:fillRef>
+          <a:effectRef idx="1">
+            <a:schemeClr val="accent1"/>
+          </a:effectRef>
+          <a:fontRef idx="minor">
+            <a:schemeClr val="tx1"/>
+          </a:fontRef>
+        </p:style>
+      </p:cxnSp>
+      <p:cxnSp>
+        <p:nvCxnSpPr>
+          <p:cNvPr id="93" name="직선 화살표 연결선 92">
+            <a:extLst>
+              <a:ext uri="{FF2B5EF4-FFF2-40B4-BE49-F238E27FC236}">
+                <a16:creationId xmlns:a16="http://schemas.microsoft.com/office/drawing/2014/main" id="{44BAE06D-A5EE-16E6-B8FE-4303749A500F}"/>
+              </a:ext>
+            </a:extLst>
+          </p:cNvPr>
+          <p:cNvCxnSpPr>
+            <a:cxnSpLocks/>
+          </p:cNvCxnSpPr>
+          <p:nvPr/>
+        </p:nvCxnSpPr>
+        <p:spPr>
+          <a:xfrm flipV="1">
+            <a:off x="2696135" y="4224338"/>
+            <a:ext cx="0" cy="494484"/>
+          </a:xfrm>
+          <a:prstGeom prst="straightConnector1">
+            <a:avLst/>
+          </a:prstGeom>
+          <a:ln w="15875">
+            <a:solidFill>
+              <a:schemeClr val="tx1"/>
+            </a:solidFill>
+            <a:tailEnd type="triangle"/>
+          </a:ln>
+        </p:spPr>
+        <p:style>
+          <a:lnRef idx="1">
+            <a:schemeClr val="accent1"/>
+          </a:lnRef>
+          <a:fillRef idx="0">
+            <a:schemeClr val="accent1"/>
+          </a:fillRef>
+          <a:effectRef idx="0">
+            <a:schemeClr val="accent1"/>
+          </a:effectRef>
+          <a:fontRef idx="minor">
+            <a:schemeClr val="tx1"/>
+          </a:fontRef>
+        </p:style>
+      </p:cxnSp>
+      <p:cxnSp>
+        <p:nvCxnSpPr>
+          <p:cNvPr id="97" name="직선 연결선 96">
+            <a:extLst>
+              <a:ext uri="{FF2B5EF4-FFF2-40B4-BE49-F238E27FC236}">
+                <a16:creationId xmlns:a16="http://schemas.microsoft.com/office/drawing/2014/main" id="{A3860A91-B342-BDE4-CCAE-9B15862E098D}"/>
+              </a:ext>
+            </a:extLst>
+          </p:cNvPr>
+          <p:cNvCxnSpPr>
+            <a:cxnSpLocks/>
+          </p:cNvCxnSpPr>
+          <p:nvPr/>
+        </p:nvCxnSpPr>
+        <p:spPr>
+          <a:xfrm>
+            <a:off x="2696135" y="3827194"/>
+            <a:ext cx="0" cy="700587"/>
+          </a:xfrm>
+          <a:prstGeom prst="line">
+            <a:avLst/>
+          </a:prstGeom>
+          <a:ln w="15875">
+            <a:solidFill>
+              <a:schemeClr val="tx1"/>
+            </a:solidFill>
+          </a:ln>
+        </p:spPr>
+        <p:style>
+          <a:lnRef idx="2">
+            <a:schemeClr val="accent1"/>
+          </a:lnRef>
+          <a:fillRef idx="0">
+            <a:schemeClr val="accent1"/>
+          </a:fillRef>
+          <a:effectRef idx="1">
+            <a:schemeClr val="accent1"/>
+          </a:effectRef>
+          <a:fontRef idx="minor">
+            <a:schemeClr val="tx1"/>
+          </a:fontRef>
+        </p:style>
+      </p:cxnSp>
+      <p:cxnSp>
+        <p:nvCxnSpPr>
+          <p:cNvPr id="98" name="직선 화살표 연결선 97">
+            <a:extLst>
+              <a:ext uri="{FF2B5EF4-FFF2-40B4-BE49-F238E27FC236}">
+                <a16:creationId xmlns:a16="http://schemas.microsoft.com/office/drawing/2014/main" id="{98433891-8BA2-9E4C-03DF-3B472E692581}"/>
+              </a:ext>
+            </a:extLst>
+          </p:cNvPr>
+          <p:cNvCxnSpPr>
+            <a:cxnSpLocks/>
+          </p:cNvCxnSpPr>
+          <p:nvPr/>
+        </p:nvCxnSpPr>
+        <p:spPr>
+          <a:xfrm flipH="1">
+            <a:off x="5753383" y="4709153"/>
+            <a:ext cx="611245" cy="0"/>
+          </a:xfrm>
+          <a:prstGeom prst="straightConnector1">
+            <a:avLst/>
+          </a:prstGeom>
+          <a:ln w="15875">
+            <a:solidFill>
+              <a:schemeClr val="tx1"/>
+            </a:solidFill>
+            <a:tailEnd type="triangle"/>
+          </a:ln>
+        </p:spPr>
+        <p:style>
+          <a:lnRef idx="1">
+            <a:schemeClr val="accent1"/>
+          </a:lnRef>
+          <a:fillRef idx="0">
+            <a:schemeClr val="accent1"/>
+          </a:fillRef>
+          <a:effectRef idx="0">
+            <a:schemeClr val="accent1"/>
+          </a:effectRef>
+          <a:fontRef idx="minor">
+            <a:schemeClr val="tx1"/>
+          </a:fontRef>
+        </p:style>
+      </p:cxnSp>
+      <p:sp>
+        <p:nvSpPr>
+          <p:cNvPr id="100" name="Google Shape;441;p31">
+            <a:extLst>
+              <a:ext uri="{FF2B5EF4-FFF2-40B4-BE49-F238E27FC236}">
+                <a16:creationId xmlns:a16="http://schemas.microsoft.com/office/drawing/2014/main" id="{EFF30ED6-A3CF-FE0E-5379-AC6B6D3702EC}"/>
+              </a:ext>
+            </a:extLst>
+          </p:cNvPr>
+          <p:cNvSpPr/>
+          <p:nvPr/>
+        </p:nvSpPr>
+        <p:spPr>
+          <a:xfrm>
+            <a:off x="4244306" y="4969495"/>
+            <a:ext cx="1702752" cy="689200"/>
+          </a:xfrm>
+          <a:prstGeom prst="roundRect">
+            <a:avLst>
+              <a:gd name="adj" fmla="val 12159"/>
+            </a:avLst>
+          </a:prstGeom>
+          <a:solidFill>
+            <a:srgbClr val="F6F4EA"/>
+          </a:solidFill>
+          <a:ln w="19050" cap="flat" cmpd="sng">
+            <a:solidFill>
+              <a:srgbClr val="E1DABD"/>
+            </a:solidFill>
+            <a:prstDash val="solid"/>
+            <a:miter lim="800000"/>
+            <a:headEnd type="none" w="sm" len="sm"/>
+            <a:tailEnd type="none" w="sm" len="sm"/>
+          </a:ln>
+        </p:spPr>
+        <p:txBody>
+          <a:bodyPr spcFirstLastPara="1" wrap="square" lIns="91433" tIns="45700" rIns="91433" bIns="45700" anchor="ctr" anchorCtr="0">
+            <a:noAutofit/>
+          </a:bodyPr>
+          <a:lstStyle/>
+          <a:p>
+            <a:pPr algn="ctr">
+              <a:lnSpc>
+                <a:spcPct val="150000"/>
+              </a:lnSpc>
+            </a:pPr>
+            <a:r>
+              <a:rPr lang="en-US" altLang="ko-KR" sz="1200" b="1" dirty="0">
+                <a:solidFill>
+                  <a:schemeClr val="dk1"/>
+                </a:solidFill>
+                <a:latin typeface="Malgun Gothic"/>
+                <a:ea typeface="Malgun Gothic"/>
+                <a:cs typeface="Malgun Gothic"/>
+                <a:sym typeface="Malgun Gothic"/>
+              </a:rPr>
+              <a:t>PMIC Status Signals</a:t>
+            </a:r>
+          </a:p>
+          <a:p>
+            <a:pPr algn="ctr">
+              <a:lnSpc>
+                <a:spcPct val="150000"/>
+              </a:lnSpc>
+            </a:pPr>
+            <a:r>
+              <a:rPr lang="en-US" altLang="ko-KR" sz="1200" dirty="0">
+                <a:solidFill>
+                  <a:schemeClr val="dk1"/>
+                </a:solidFill>
+                <a:latin typeface="Malgun Gothic"/>
+                <a:ea typeface="Malgun Gothic"/>
+                <a:cs typeface="Malgun Gothic"/>
+                <a:sym typeface="Malgun Gothic"/>
+              </a:rPr>
+              <a:t>(Connector)</a:t>
+            </a:r>
+          </a:p>
+        </p:txBody>
+      </p:sp>
+      <p:cxnSp>
+        <p:nvCxnSpPr>
+          <p:cNvPr id="101" name="직선 화살표 연결선 100">
+            <a:extLst>
+              <a:ext uri="{FF2B5EF4-FFF2-40B4-BE49-F238E27FC236}">
+                <a16:creationId xmlns:a16="http://schemas.microsoft.com/office/drawing/2014/main" id="{1E2DD925-D7C6-EC70-4F7F-DC8D9A433ED5}"/>
+              </a:ext>
+            </a:extLst>
+          </p:cNvPr>
+          <p:cNvCxnSpPr>
+            <a:cxnSpLocks/>
+          </p:cNvCxnSpPr>
+          <p:nvPr/>
+        </p:nvCxnSpPr>
+        <p:spPr>
+          <a:xfrm>
+            <a:off x="3614167" y="4498042"/>
+            <a:ext cx="0" cy="431411"/>
+          </a:xfrm>
+          <a:prstGeom prst="straightConnector1">
+            <a:avLst/>
+          </a:prstGeom>
+          <a:ln w="15875">
+            <a:solidFill>
+              <a:schemeClr val="tx1"/>
+            </a:solidFill>
+            <a:tailEnd type="triangle"/>
+          </a:ln>
+        </p:spPr>
+        <p:style>
+          <a:lnRef idx="1">
+            <a:schemeClr val="accent1"/>
+          </a:lnRef>
+          <a:fillRef idx="0">
+            <a:schemeClr val="accent1"/>
+          </a:fillRef>
+          <a:effectRef idx="0">
+            <a:schemeClr val="accent1"/>
+          </a:effectRef>
+          <a:fontRef idx="minor">
+            <a:schemeClr val="tx1"/>
+          </a:fontRef>
+        </p:style>
+      </p:cxnSp>
+      <p:cxnSp>
+        <p:nvCxnSpPr>
+          <p:cNvPr id="104" name="직선 화살표 연결선 103">
+            <a:extLst>
+              <a:ext uri="{FF2B5EF4-FFF2-40B4-BE49-F238E27FC236}">
+                <a16:creationId xmlns:a16="http://schemas.microsoft.com/office/drawing/2014/main" id="{AACA31E4-3BB0-0171-E05D-4C29D6E6283D}"/>
+              </a:ext>
+            </a:extLst>
+          </p:cNvPr>
+          <p:cNvCxnSpPr>
+            <a:cxnSpLocks/>
+          </p:cNvCxnSpPr>
+          <p:nvPr/>
+        </p:nvCxnSpPr>
+        <p:spPr>
+          <a:xfrm>
+            <a:off x="4538381" y="4503116"/>
+            <a:ext cx="0" cy="431411"/>
+          </a:xfrm>
+          <a:prstGeom prst="straightConnector1">
+            <a:avLst/>
+          </a:prstGeom>
+          <a:ln w="15875">
+            <a:solidFill>
+              <a:schemeClr val="tx1"/>
+            </a:solidFill>
+            <a:tailEnd type="triangle"/>
+          </a:ln>
+        </p:spPr>
+        <p:style>
+          <a:lnRef idx="1">
+            <a:schemeClr val="accent1"/>
+          </a:lnRef>
+          <a:fillRef idx="0">
+            <a:schemeClr val="accent1"/>
+          </a:fillRef>
+          <a:effectRef idx="0">
+            <a:schemeClr val="accent1"/>
+          </a:effectRef>
+          <a:fontRef idx="minor">
+            <a:schemeClr val="tx1"/>
+          </a:fontRef>
+        </p:style>
+      </p:cxnSp>
+      <p:sp>
+        <p:nvSpPr>
+          <p:cNvPr id="105" name="직사각형 104">
+            <a:extLst>
+              <a:ext uri="{FF2B5EF4-FFF2-40B4-BE49-F238E27FC236}">
+                <a16:creationId xmlns:a16="http://schemas.microsoft.com/office/drawing/2014/main" id="{93617D36-675C-024E-F5C7-91F8273C9621}"/>
+              </a:ext>
+            </a:extLst>
+          </p:cNvPr>
+          <p:cNvSpPr/>
+          <p:nvPr/>
+        </p:nvSpPr>
+        <p:spPr>
+          <a:xfrm>
+            <a:off x="2236490" y="5726341"/>
+            <a:ext cx="1702752" cy="1085969"/>
+          </a:xfrm>
+          <a:prstGeom prst="rect">
+            <a:avLst/>
+          </a:prstGeom>
+          <a:noFill/>
+          <a:ln w="6350">
+            <a:solidFill>
+              <a:schemeClr val="tx1"/>
+            </a:solidFill>
+          </a:ln>
+        </p:spPr>
+        <p:style>
+          <a:lnRef idx="2">
+            <a:schemeClr val="accent1">
+              <a:shade val="15000"/>
+            </a:schemeClr>
+          </a:lnRef>
+          <a:fillRef idx="1">
+            <a:schemeClr val="accent1"/>
+          </a:fillRef>
+          <a:effectRef idx="0">
+            <a:schemeClr val="accent1"/>
+          </a:effectRef>
+          <a:fontRef idx="minor">
+            <a:schemeClr val="lt1"/>
+          </a:fontRef>
+        </p:style>
+        <p:txBody>
+          <a:bodyPr wrap="square" lIns="0" rtlCol="0" anchor="t">
+            <a:noAutofit/>
+          </a:bodyPr>
+          <a:lstStyle/>
+          <a:p>
+            <a:pPr marL="216000" indent="-144000">
+              <a:buAutoNum type="arabicPeriod"/>
+            </a:pPr>
+            <a:r>
+              <a:rPr lang="en-US" altLang="ko-KR" sz="800" b="1" dirty="0">
+                <a:solidFill>
+                  <a:schemeClr val="tx1"/>
+                </a:solidFill>
+              </a:rPr>
+              <a:t>DP5VS</a:t>
+            </a:r>
+          </a:p>
+          <a:p>
+            <a:pPr marL="216000" indent="-144000">
+              <a:buAutoNum type="arabicPeriod"/>
+            </a:pPr>
+            <a:r>
+              <a:rPr lang="en-US" altLang="ko-KR" sz="800" b="1" dirty="0">
+                <a:solidFill>
+                  <a:schemeClr val="tx1"/>
+                </a:solidFill>
+              </a:rPr>
+              <a:t>DP1.35V (DCDC1’s Vout)</a:t>
+            </a:r>
+          </a:p>
+          <a:p>
+            <a:pPr marL="216000" indent="-144000">
+              <a:buAutoNum type="arabicPeriod"/>
+            </a:pPr>
+            <a:r>
+              <a:rPr lang="en-US" altLang="ko-KR" sz="800" b="1" dirty="0">
+                <a:solidFill>
+                  <a:schemeClr val="tx1"/>
+                </a:solidFill>
+              </a:rPr>
+              <a:t>DP1.1V (DCDC2’s Vout)</a:t>
+            </a:r>
+          </a:p>
+          <a:p>
+            <a:pPr marL="216000" indent="-144000">
+              <a:buAutoNum type="arabicPeriod"/>
+            </a:pPr>
+            <a:r>
+              <a:rPr lang="en-US" altLang="ko-KR" sz="800" b="1" dirty="0">
+                <a:solidFill>
+                  <a:schemeClr val="tx1"/>
+                </a:solidFill>
+              </a:rPr>
+              <a:t>DP1.1V (DCDC3’s Vout)</a:t>
+            </a:r>
+          </a:p>
+          <a:p>
+            <a:pPr marL="216000" indent="-144000">
+              <a:buAutoNum type="arabicPeriod"/>
+            </a:pPr>
+            <a:r>
+              <a:rPr lang="en-US" altLang="ko-KR" sz="800" b="1" dirty="0">
+                <a:solidFill>
+                  <a:schemeClr val="tx1"/>
+                </a:solidFill>
+              </a:rPr>
+              <a:t>DP1.8V (LDO1’s Vout)</a:t>
+            </a:r>
+          </a:p>
+          <a:p>
+            <a:pPr marL="216000" indent="-144000">
+              <a:buAutoNum type="arabicPeriod"/>
+            </a:pPr>
+            <a:r>
+              <a:rPr lang="en-US" altLang="ko-KR" sz="800" b="1" dirty="0">
+                <a:solidFill>
+                  <a:schemeClr val="tx1"/>
+                </a:solidFill>
+              </a:rPr>
+              <a:t>DP3.3V (LDO2’s Vout)</a:t>
+            </a:r>
+          </a:p>
+          <a:p>
+            <a:pPr marL="216000" indent="-144000">
+              <a:buAutoNum type="arabicPeriod"/>
+            </a:pPr>
+            <a:r>
+              <a:rPr lang="en-US" altLang="ko-KR" sz="800" b="1" dirty="0">
+                <a:solidFill>
+                  <a:schemeClr val="tx1"/>
+                </a:solidFill>
+              </a:rPr>
+              <a:t>DP1.8V (LDO3’s Vout)</a:t>
+            </a:r>
+          </a:p>
+          <a:p>
+            <a:pPr marL="216000" indent="-144000">
+              <a:buAutoNum type="arabicPeriod"/>
+            </a:pPr>
+            <a:r>
+              <a:rPr lang="en-US" altLang="ko-KR" sz="800" b="1" dirty="0">
+                <a:solidFill>
+                  <a:schemeClr val="tx1"/>
+                </a:solidFill>
+              </a:rPr>
+              <a:t>DP3.3V (LDO4’s Vout)</a:t>
+            </a:r>
+            <a:endParaRPr lang="ko-KR" altLang="en-US" sz="800" b="1" dirty="0">
+              <a:solidFill>
+                <a:schemeClr val="tx1"/>
+              </a:solidFill>
+            </a:endParaRPr>
+          </a:p>
+        </p:txBody>
+      </p:sp>
+      <p:sp>
+        <p:nvSpPr>
+          <p:cNvPr id="106" name="직사각형 105">
+            <a:extLst>
+              <a:ext uri="{FF2B5EF4-FFF2-40B4-BE49-F238E27FC236}">
+                <a16:creationId xmlns:a16="http://schemas.microsoft.com/office/drawing/2014/main" id="{380C6ADF-3A11-1059-00A1-D1F0C42EE405}"/>
+              </a:ext>
+            </a:extLst>
+          </p:cNvPr>
+          <p:cNvSpPr/>
+          <p:nvPr/>
+        </p:nvSpPr>
+        <p:spPr>
+          <a:xfrm>
+            <a:off x="4244306" y="5726340"/>
+            <a:ext cx="1702752" cy="1085969"/>
+          </a:xfrm>
+          <a:prstGeom prst="rect">
+            <a:avLst/>
+          </a:prstGeom>
+          <a:noFill/>
+          <a:ln w="6350">
+            <a:solidFill>
+              <a:schemeClr val="tx1"/>
+            </a:solidFill>
+          </a:ln>
+        </p:spPr>
+        <p:style>
+          <a:lnRef idx="2">
+            <a:schemeClr val="accent1">
+              <a:shade val="15000"/>
+            </a:schemeClr>
+          </a:lnRef>
+          <a:fillRef idx="1">
+            <a:schemeClr val="accent1"/>
+          </a:fillRef>
+          <a:effectRef idx="0">
+            <a:schemeClr val="accent1"/>
+          </a:effectRef>
+          <a:fontRef idx="minor">
+            <a:schemeClr val="lt1"/>
+          </a:fontRef>
+        </p:style>
+        <p:txBody>
+          <a:bodyPr wrap="square" lIns="0" rtlCol="0" anchor="t">
+            <a:noAutofit/>
+          </a:bodyPr>
+          <a:lstStyle/>
+          <a:p>
+            <a:pPr marL="216000" indent="-144000">
+              <a:buAutoNum type="arabicPeriod"/>
+            </a:pPr>
+            <a:r>
+              <a:rPr lang="en-US" altLang="ko-KR" sz="800" b="1" dirty="0">
+                <a:solidFill>
+                  <a:schemeClr val="tx1"/>
+                </a:solidFill>
+              </a:rPr>
+              <a:t>MCU PMIC Power Enable</a:t>
+            </a:r>
+          </a:p>
+          <a:p>
+            <a:pPr marL="216000" indent="-144000">
+              <a:buAutoNum type="arabicPeriod"/>
+            </a:pPr>
+            <a:r>
+              <a:rPr lang="en-US" altLang="ko-KR" sz="800" b="1" dirty="0">
+                <a:solidFill>
+                  <a:schemeClr val="tx1"/>
+                </a:solidFill>
+              </a:rPr>
+              <a:t>MCU PMIC PGOOD</a:t>
+            </a:r>
+          </a:p>
+          <a:p>
+            <a:pPr marL="216000" indent="-144000">
+              <a:buAutoNum type="arabicPeriod"/>
+            </a:pPr>
+            <a:r>
+              <a:rPr lang="en-US" altLang="ko-KR" sz="800" b="1" dirty="0">
+                <a:solidFill>
+                  <a:schemeClr val="tx1"/>
+                </a:solidFill>
+              </a:rPr>
+              <a:t>MCU PMIC LDO PGOOD</a:t>
+            </a:r>
+          </a:p>
+          <a:p>
+            <a:pPr marL="216000" indent="-144000">
+              <a:buAutoNum type="arabicPeriod"/>
+            </a:pPr>
+            <a:r>
+              <a:rPr lang="en-US" altLang="ko-KR" sz="800" b="1" dirty="0">
+                <a:solidFill>
+                  <a:schemeClr val="tx1"/>
+                </a:solidFill>
+              </a:rPr>
+              <a:t>MCU PMIC nINT</a:t>
+            </a:r>
+          </a:p>
+          <a:p>
+            <a:pPr marL="216000" indent="-144000">
+              <a:buAutoNum type="arabicPeriod"/>
+            </a:pPr>
+            <a:r>
+              <a:rPr lang="en-US" altLang="ko-KR" sz="800" b="1" dirty="0">
+                <a:solidFill>
+                  <a:schemeClr val="tx1"/>
+                </a:solidFill>
+              </a:rPr>
+              <a:t>MCU PMIC nWAKEUP</a:t>
+            </a:r>
+          </a:p>
+          <a:p>
+            <a:pPr marL="216000" indent="-144000">
+              <a:buAutoNum type="arabicPeriod"/>
+            </a:pPr>
+            <a:r>
+              <a:rPr lang="en-US" altLang="ko-KR" sz="800" b="1" dirty="0">
+                <a:solidFill>
+                  <a:schemeClr val="tx1"/>
+                </a:solidFill>
+              </a:rPr>
+              <a:t>MCU I2C1 SCL</a:t>
+            </a:r>
+          </a:p>
+          <a:p>
+            <a:pPr marL="216000" indent="-144000">
+              <a:buAutoNum type="arabicPeriod"/>
+            </a:pPr>
+            <a:r>
+              <a:rPr lang="en-US" altLang="ko-KR" sz="800" b="1" dirty="0">
+                <a:solidFill>
+                  <a:schemeClr val="tx1"/>
+                </a:solidFill>
+              </a:rPr>
+              <a:t>MCU I2C1 SDA</a:t>
+            </a:r>
+            <a:endParaRPr lang="ko-KR" altLang="en-US" sz="800" b="1" dirty="0">
+              <a:solidFill>
+                <a:schemeClr val="tx1"/>
+              </a:solidFill>
+            </a:endParaRPr>
+          </a:p>
+        </p:txBody>
+      </p:sp>
+      <p:sp>
+        <p:nvSpPr>
+          <p:cNvPr id="108" name="직사각형 107">
+            <a:extLst>
+              <a:ext uri="{FF2B5EF4-FFF2-40B4-BE49-F238E27FC236}">
+                <a16:creationId xmlns:a16="http://schemas.microsoft.com/office/drawing/2014/main" id="{399F54F9-D56D-D5CA-68E6-8A73C2B97F0F}"/>
+              </a:ext>
+            </a:extLst>
+          </p:cNvPr>
+          <p:cNvSpPr/>
+          <p:nvPr/>
+        </p:nvSpPr>
+        <p:spPr>
+          <a:xfrm>
+            <a:off x="8964230" y="1585307"/>
+            <a:ext cx="389508" cy="241300"/>
+          </a:xfrm>
+          <a:prstGeom prst="rect">
+            <a:avLst/>
+          </a:prstGeom>
+          <a:noFill/>
+          <a:ln w="6350">
+            <a:solidFill>
+              <a:schemeClr val="tx1"/>
+            </a:solidFill>
+          </a:ln>
+        </p:spPr>
+        <p:style>
+          <a:lnRef idx="2">
+            <a:schemeClr val="accent1">
+              <a:shade val="15000"/>
+            </a:schemeClr>
+          </a:lnRef>
+          <a:fillRef idx="1">
+            <a:schemeClr val="accent1"/>
+          </a:fillRef>
+          <a:effectRef idx="0">
+            <a:schemeClr val="accent1"/>
+          </a:effectRef>
+          <a:fontRef idx="minor">
+            <a:schemeClr val="lt1"/>
+          </a:fontRef>
+        </p:style>
+        <p:txBody>
+          <a:bodyPr rtlCol="0" anchor="ctr"/>
+          <a:lstStyle/>
+          <a:p>
+            <a:pPr algn="ctr"/>
+            <a:r>
+              <a:rPr lang="en-US" altLang="ko-KR" sz="800" b="1" dirty="0">
+                <a:solidFill>
+                  <a:schemeClr val="tx1"/>
+                </a:solidFill>
+              </a:rPr>
+              <a:t>PB6</a:t>
+            </a:r>
+            <a:endParaRPr lang="ko-KR" altLang="en-US" sz="800" b="1" dirty="0">
+              <a:solidFill>
+                <a:schemeClr val="tx1"/>
+              </a:solidFill>
+            </a:endParaRPr>
+          </a:p>
+        </p:txBody>
+      </p:sp>
+      <p:sp>
+        <p:nvSpPr>
+          <p:cNvPr id="109" name="직사각형 108">
+            <a:extLst>
+              <a:ext uri="{FF2B5EF4-FFF2-40B4-BE49-F238E27FC236}">
+                <a16:creationId xmlns:a16="http://schemas.microsoft.com/office/drawing/2014/main" id="{81E475BF-1DE0-6ABE-0295-7E849F8B95C9}"/>
+              </a:ext>
+            </a:extLst>
+          </p:cNvPr>
+          <p:cNvSpPr/>
+          <p:nvPr/>
+        </p:nvSpPr>
+        <p:spPr>
+          <a:xfrm>
+            <a:off x="8964230" y="1887927"/>
+            <a:ext cx="389508" cy="241300"/>
+          </a:xfrm>
+          <a:prstGeom prst="rect">
+            <a:avLst/>
+          </a:prstGeom>
+          <a:noFill/>
+          <a:ln w="6350">
+            <a:solidFill>
+              <a:schemeClr val="tx1"/>
+            </a:solidFill>
+          </a:ln>
+        </p:spPr>
+        <p:style>
+          <a:lnRef idx="2">
+            <a:schemeClr val="accent1">
+              <a:shade val="15000"/>
+            </a:schemeClr>
+          </a:lnRef>
+          <a:fillRef idx="1">
+            <a:schemeClr val="accent1"/>
+          </a:fillRef>
+          <a:effectRef idx="0">
+            <a:schemeClr val="accent1"/>
+          </a:effectRef>
+          <a:fontRef idx="minor">
+            <a:schemeClr val="lt1"/>
+          </a:fontRef>
+        </p:style>
+        <p:txBody>
+          <a:bodyPr rtlCol="0" anchor="ctr"/>
+          <a:lstStyle/>
+          <a:p>
+            <a:pPr algn="ctr"/>
+            <a:r>
+              <a:rPr lang="en-US" altLang="ko-KR" sz="800" b="1" dirty="0">
+                <a:solidFill>
+                  <a:schemeClr val="tx1"/>
+                </a:solidFill>
+              </a:rPr>
+              <a:t>PB7</a:t>
+            </a:r>
+            <a:endParaRPr lang="ko-KR" altLang="en-US" sz="800" b="1" dirty="0">
+              <a:solidFill>
+                <a:schemeClr val="tx1"/>
+              </a:solidFill>
+            </a:endParaRPr>
+          </a:p>
+        </p:txBody>
+      </p:sp>
+      <p:sp>
+        <p:nvSpPr>
+          <p:cNvPr id="110" name="직사각형 109">
+            <a:extLst>
+              <a:ext uri="{FF2B5EF4-FFF2-40B4-BE49-F238E27FC236}">
+                <a16:creationId xmlns:a16="http://schemas.microsoft.com/office/drawing/2014/main" id="{1889E957-CF34-846B-0755-B9E07FC6815C}"/>
+              </a:ext>
+            </a:extLst>
+          </p:cNvPr>
+          <p:cNvSpPr/>
+          <p:nvPr/>
+        </p:nvSpPr>
+        <p:spPr>
+          <a:xfrm>
+            <a:off x="8964230" y="2885010"/>
+            <a:ext cx="389508" cy="241300"/>
+          </a:xfrm>
+          <a:prstGeom prst="rect">
+            <a:avLst/>
+          </a:prstGeom>
+          <a:noFill/>
+          <a:ln w="6350">
+            <a:solidFill>
+              <a:schemeClr val="tx1"/>
+            </a:solidFill>
+          </a:ln>
+        </p:spPr>
+        <p:style>
+          <a:lnRef idx="2">
+            <a:schemeClr val="accent1">
+              <a:shade val="15000"/>
+            </a:schemeClr>
+          </a:lnRef>
+          <a:fillRef idx="1">
+            <a:schemeClr val="accent1"/>
+          </a:fillRef>
+          <a:effectRef idx="0">
+            <a:schemeClr val="accent1"/>
+          </a:effectRef>
+          <a:fontRef idx="minor">
+            <a:schemeClr val="lt1"/>
+          </a:fontRef>
+        </p:style>
+        <p:txBody>
+          <a:bodyPr rtlCol="0" anchor="ctr"/>
+          <a:lstStyle/>
+          <a:p>
+            <a:pPr algn="ctr"/>
+            <a:r>
+              <a:rPr lang="en-US" altLang="ko-KR" sz="800" b="1" dirty="0">
+                <a:solidFill>
+                  <a:schemeClr val="tx1"/>
+                </a:solidFill>
+              </a:rPr>
+              <a:t>PA1</a:t>
+            </a:r>
+            <a:endParaRPr lang="ko-KR" altLang="en-US" sz="800" b="1" dirty="0">
+              <a:solidFill>
+                <a:schemeClr val="tx1"/>
+              </a:solidFill>
+            </a:endParaRPr>
+          </a:p>
+        </p:txBody>
+      </p:sp>
+      <p:sp>
+        <p:nvSpPr>
+          <p:cNvPr id="111" name="직사각형 110">
+            <a:extLst>
+              <a:ext uri="{FF2B5EF4-FFF2-40B4-BE49-F238E27FC236}">
+                <a16:creationId xmlns:a16="http://schemas.microsoft.com/office/drawing/2014/main" id="{B9FC4CE4-964B-6CB4-01CA-BE106ABD5E54}"/>
+              </a:ext>
+            </a:extLst>
+          </p:cNvPr>
+          <p:cNvSpPr/>
+          <p:nvPr/>
+        </p:nvSpPr>
+        <p:spPr>
+          <a:xfrm>
+            <a:off x="8960573" y="3187700"/>
+            <a:ext cx="389508" cy="241300"/>
+          </a:xfrm>
+          <a:prstGeom prst="rect">
+            <a:avLst/>
+          </a:prstGeom>
+          <a:noFill/>
+          <a:ln w="6350">
+            <a:solidFill>
+              <a:schemeClr val="tx1"/>
+            </a:solidFill>
+          </a:ln>
+        </p:spPr>
+        <p:style>
+          <a:lnRef idx="2">
+            <a:schemeClr val="accent1">
+              <a:shade val="15000"/>
+            </a:schemeClr>
+          </a:lnRef>
+          <a:fillRef idx="1">
+            <a:schemeClr val="accent1"/>
+          </a:fillRef>
+          <a:effectRef idx="0">
+            <a:schemeClr val="accent1"/>
+          </a:effectRef>
+          <a:fontRef idx="minor">
+            <a:schemeClr val="lt1"/>
+          </a:fontRef>
+        </p:style>
+        <p:txBody>
+          <a:bodyPr rtlCol="0" anchor="ctr"/>
+          <a:lstStyle/>
+          <a:p>
+            <a:pPr algn="ctr"/>
+            <a:r>
+              <a:rPr lang="en-US" altLang="ko-KR" sz="800" b="1" dirty="0">
+                <a:solidFill>
+                  <a:schemeClr val="tx1"/>
+                </a:solidFill>
+              </a:rPr>
+              <a:t>PA2</a:t>
+            </a:r>
+            <a:endParaRPr lang="ko-KR" altLang="en-US" sz="800" b="1" dirty="0">
+              <a:solidFill>
+                <a:schemeClr val="tx1"/>
+              </a:solidFill>
+            </a:endParaRPr>
+          </a:p>
+        </p:txBody>
+      </p:sp>
+      <p:sp>
+        <p:nvSpPr>
+          <p:cNvPr id="112" name="직사각형 111">
+            <a:extLst>
+              <a:ext uri="{FF2B5EF4-FFF2-40B4-BE49-F238E27FC236}">
+                <a16:creationId xmlns:a16="http://schemas.microsoft.com/office/drawing/2014/main" id="{32A8D7D5-C1B8-3A9B-85C0-B0A57BEA48A2}"/>
+              </a:ext>
+            </a:extLst>
+          </p:cNvPr>
+          <p:cNvSpPr/>
+          <p:nvPr/>
+        </p:nvSpPr>
+        <p:spPr>
+          <a:xfrm>
+            <a:off x="8967714" y="3490391"/>
+            <a:ext cx="389508" cy="241300"/>
+          </a:xfrm>
+          <a:prstGeom prst="rect">
+            <a:avLst/>
+          </a:prstGeom>
+          <a:noFill/>
+          <a:ln w="6350">
+            <a:solidFill>
+              <a:schemeClr val="tx1"/>
+            </a:solidFill>
+          </a:ln>
+        </p:spPr>
+        <p:style>
+          <a:lnRef idx="2">
+            <a:schemeClr val="accent1">
+              <a:shade val="15000"/>
+            </a:schemeClr>
+          </a:lnRef>
+          <a:fillRef idx="1">
+            <a:schemeClr val="accent1"/>
+          </a:fillRef>
+          <a:effectRef idx="0">
+            <a:schemeClr val="accent1"/>
+          </a:effectRef>
+          <a:fontRef idx="minor">
+            <a:schemeClr val="lt1"/>
+          </a:fontRef>
+        </p:style>
+        <p:txBody>
+          <a:bodyPr rtlCol="0" anchor="ctr"/>
+          <a:lstStyle/>
+          <a:p>
+            <a:pPr algn="ctr"/>
+            <a:r>
+              <a:rPr lang="en-US" altLang="ko-KR" sz="800" b="1" dirty="0">
+                <a:solidFill>
+                  <a:schemeClr val="tx1"/>
+                </a:solidFill>
+              </a:rPr>
+              <a:t>PA3</a:t>
+            </a:r>
+            <a:endParaRPr lang="ko-KR" altLang="en-US" sz="800" b="1" dirty="0">
+              <a:solidFill>
+                <a:schemeClr val="tx1"/>
+              </a:solidFill>
+            </a:endParaRPr>
+          </a:p>
+        </p:txBody>
+      </p:sp>
+      <p:sp>
+        <p:nvSpPr>
+          <p:cNvPr id="113" name="직사각형 112">
+            <a:extLst>
+              <a:ext uri="{FF2B5EF4-FFF2-40B4-BE49-F238E27FC236}">
+                <a16:creationId xmlns:a16="http://schemas.microsoft.com/office/drawing/2014/main" id="{45336DE4-71DD-F302-7C3D-BE7F8AF4E0A0}"/>
+              </a:ext>
+            </a:extLst>
+          </p:cNvPr>
+          <p:cNvSpPr/>
+          <p:nvPr/>
+        </p:nvSpPr>
+        <p:spPr>
+          <a:xfrm>
+            <a:off x="8960573" y="3801216"/>
+            <a:ext cx="389508" cy="241300"/>
+          </a:xfrm>
+          <a:prstGeom prst="rect">
+            <a:avLst/>
+          </a:prstGeom>
+          <a:noFill/>
+          <a:ln w="6350">
+            <a:solidFill>
+              <a:schemeClr val="tx1"/>
+            </a:solidFill>
+          </a:ln>
+        </p:spPr>
+        <p:style>
+          <a:lnRef idx="2">
+            <a:schemeClr val="accent1">
+              <a:shade val="15000"/>
+            </a:schemeClr>
+          </a:lnRef>
+          <a:fillRef idx="1">
+            <a:schemeClr val="accent1"/>
+          </a:fillRef>
+          <a:effectRef idx="0">
+            <a:schemeClr val="accent1"/>
+          </a:effectRef>
+          <a:fontRef idx="minor">
+            <a:schemeClr val="lt1"/>
+          </a:fontRef>
+        </p:style>
+        <p:txBody>
+          <a:bodyPr rtlCol="0" anchor="ctr"/>
+          <a:lstStyle/>
+          <a:p>
+            <a:pPr algn="ctr"/>
+            <a:r>
+              <a:rPr lang="en-US" altLang="ko-KR" sz="800" b="1" dirty="0">
+                <a:solidFill>
+                  <a:schemeClr val="tx1"/>
+                </a:solidFill>
+              </a:rPr>
+              <a:t>PA4</a:t>
+            </a:r>
+            <a:endParaRPr lang="ko-KR" altLang="en-US" sz="800" b="1" dirty="0">
+              <a:solidFill>
+                <a:schemeClr val="tx1"/>
+              </a:solidFill>
+            </a:endParaRPr>
+          </a:p>
+        </p:txBody>
+      </p:sp>
+      <p:sp>
+        <p:nvSpPr>
+          <p:cNvPr id="114" name="직사각형 113">
+            <a:extLst>
+              <a:ext uri="{FF2B5EF4-FFF2-40B4-BE49-F238E27FC236}">
+                <a16:creationId xmlns:a16="http://schemas.microsoft.com/office/drawing/2014/main" id="{B358C6FB-28DC-DF4E-F3DD-C552D0ACD47A}"/>
+              </a:ext>
+            </a:extLst>
+          </p:cNvPr>
+          <p:cNvSpPr/>
+          <p:nvPr/>
+        </p:nvSpPr>
+        <p:spPr>
+          <a:xfrm>
+            <a:off x="8960573" y="4588503"/>
+            <a:ext cx="389508" cy="241300"/>
+          </a:xfrm>
+          <a:prstGeom prst="rect">
+            <a:avLst/>
+          </a:prstGeom>
+          <a:noFill/>
+          <a:ln w="6350">
+            <a:solidFill>
+              <a:schemeClr val="tx1"/>
+            </a:solidFill>
+          </a:ln>
+        </p:spPr>
+        <p:style>
+          <a:lnRef idx="2">
+            <a:schemeClr val="accent1">
+              <a:shade val="15000"/>
+            </a:schemeClr>
+          </a:lnRef>
+          <a:fillRef idx="1">
+            <a:schemeClr val="accent1"/>
+          </a:fillRef>
+          <a:effectRef idx="0">
+            <a:schemeClr val="accent1"/>
+          </a:effectRef>
+          <a:fontRef idx="minor">
+            <a:schemeClr val="lt1"/>
+          </a:fontRef>
+        </p:style>
+        <p:txBody>
+          <a:bodyPr rtlCol="0" anchor="ctr"/>
+          <a:lstStyle/>
+          <a:p>
+            <a:pPr algn="ctr"/>
+            <a:r>
+              <a:rPr lang="en-US" altLang="ko-KR" sz="800" b="1" dirty="0">
+                <a:solidFill>
+                  <a:schemeClr val="tx1"/>
+                </a:solidFill>
+              </a:rPr>
+              <a:t>PA0</a:t>
+            </a:r>
+            <a:endParaRPr lang="ko-KR" altLang="en-US" sz="800" b="1" dirty="0">
+              <a:solidFill>
+                <a:schemeClr val="tx1"/>
+              </a:solidFill>
+            </a:endParaRPr>
+          </a:p>
+        </p:txBody>
+      </p:sp>
+      <p:sp>
+        <p:nvSpPr>
+          <p:cNvPr id="115" name="직사각형 114">
+            <a:extLst>
+              <a:ext uri="{FF2B5EF4-FFF2-40B4-BE49-F238E27FC236}">
+                <a16:creationId xmlns:a16="http://schemas.microsoft.com/office/drawing/2014/main" id="{489E0361-6646-2DCE-73B4-7B9B1F7234F8}"/>
+              </a:ext>
+            </a:extLst>
+          </p:cNvPr>
+          <p:cNvSpPr/>
+          <p:nvPr/>
+        </p:nvSpPr>
+        <p:spPr>
+          <a:xfrm>
+            <a:off x="8967714" y="368378"/>
+            <a:ext cx="747686" cy="241300"/>
+          </a:xfrm>
+          <a:prstGeom prst="rect">
+            <a:avLst/>
+          </a:prstGeom>
+          <a:noFill/>
+          <a:ln w="6350">
+            <a:solidFill>
+              <a:schemeClr val="tx1"/>
+            </a:solidFill>
+          </a:ln>
+        </p:spPr>
+        <p:style>
+          <a:lnRef idx="2">
+            <a:schemeClr val="accent1">
+              <a:shade val="15000"/>
+            </a:schemeClr>
+          </a:lnRef>
+          <a:fillRef idx="1">
+            <a:schemeClr val="accent1"/>
+          </a:fillRef>
+          <a:effectRef idx="0">
+            <a:schemeClr val="accent1"/>
+          </a:effectRef>
+          <a:fontRef idx="minor">
+            <a:schemeClr val="lt1"/>
+          </a:fontRef>
+        </p:style>
+        <p:txBody>
+          <a:bodyPr rtlCol="0" anchor="ctr"/>
+          <a:lstStyle/>
+          <a:p>
+            <a:pPr algn="ctr"/>
+            <a:r>
+              <a:rPr lang="en-US" altLang="ko-KR" sz="800" b="1" dirty="0">
+                <a:solidFill>
+                  <a:schemeClr val="tx1"/>
+                </a:solidFill>
+              </a:rPr>
+              <a:t>VDD/VDDA</a:t>
+            </a:r>
+            <a:endParaRPr lang="ko-KR" altLang="en-US" sz="800" b="1" dirty="0">
+              <a:solidFill>
+                <a:schemeClr val="tx1"/>
+              </a:solidFill>
+            </a:endParaRPr>
+          </a:p>
+        </p:txBody>
+      </p:sp>
+    </p:spTree>
+    <p:extLst>
+      <p:ext uri="{BB962C8B-B14F-4D97-AF65-F5344CB8AC3E}">
+        <p14:creationId xmlns:p14="http://schemas.microsoft.com/office/powerpoint/2010/main" val="299597424"/>
+      </p:ext>
+    </p:extLst>
+  </p:cSld>
+  <p:clrMapOvr>
+    <a:masterClrMapping/>
+  </p:clrMapOvr>
+</p:sld>
+</file>
+
+<file path=ppt/slides/slide3.xml><?xml version="1.0" encoding="utf-8"?>
 <p:sld xmlns:a="http://schemas.openxmlformats.org/drawingml/2006/main" xmlns:r="http://schemas.openxmlformats.org/officeDocument/2006/relationships" xmlns:p="http://schemas.openxmlformats.org/presentationml/2006/main">
   <p:cSld>
     <p:spTree>
@@ -10906,7 +14944,7 @@
 </p:sld>
 </file>
 
-<file path=ppt/slides/slide3.xml><?xml version="1.0" encoding="utf-8"?>
+<file path=ppt/slides/slide4.xml><?xml version="1.0" encoding="utf-8"?>
 <p:sld xmlns:a="http://schemas.openxmlformats.org/drawingml/2006/main" xmlns:r="http://schemas.openxmlformats.org/officeDocument/2006/relationships" xmlns:p="http://schemas.openxmlformats.org/presentationml/2006/main">
   <p:cSld>
     <p:spTree>
@@ -14397,7 +18435,7 @@
 </p:sld>
 </file>
 
-<file path=ppt/slides/slide4.xml><?xml version="1.0" encoding="utf-8"?>
+<file path=ppt/slides/slide5.xml><?xml version="1.0" encoding="utf-8"?>
 <p:sld xmlns:a="http://schemas.openxmlformats.org/drawingml/2006/main" xmlns:r="http://schemas.openxmlformats.org/officeDocument/2006/relationships" xmlns:p="http://schemas.openxmlformats.org/presentationml/2006/main">
   <p:cSld>
     <p:spTree>

</xml_diff>